<commit_message>
Added graphs on slides
</commit_message>
<xml_diff>
--- a/slides/diluccio_giamba_RL_project.pptx
+++ b/slides/diluccio_giamba_RL_project.pptx
@@ -6314,14 +6314,14 @@
           <a:effectLst/>
           <a:extLst>
             <a:ext uri="{909E8E84-426E-40dd-AFC4-6F175D3DCCD1}">
-              <a14:hiddenFill xmlns:a14="http://schemas.microsoft.com/office/drawing/2010/main" xmlns="">
+              <a14:hiddenFill xmlns="" xmlns:a14="http://schemas.microsoft.com/office/drawing/2010/main">
                 <a:solidFill>
                   <a:schemeClr val="accent1"/>
                 </a:solidFill>
               </a14:hiddenFill>
             </a:ext>
             <a:ext uri="{91240B29-F687-4f45-9708-019B960494DF}">
-              <a14:hiddenLine xmlns:a14="http://schemas.microsoft.com/office/drawing/2010/main" xmlns="" w="9525" cap="flat" cmpd="sng" algn="ctr">
+              <a14:hiddenLine xmlns="" xmlns:a14="http://schemas.microsoft.com/office/drawing/2010/main" w="9525" cap="flat" cmpd="sng" algn="ctr">
                 <a:solidFill>
                   <a:schemeClr val="tx1"/>
                 </a:solidFill>
@@ -6332,7 +6332,7 @@
               </a14:hiddenLine>
             </a:ext>
             <a:ext uri="{AF507438-7753-43e0-B8FC-AC1667EBCBE1}">
-              <a14:hiddenEffects xmlns:a14="http://schemas.microsoft.com/office/drawing/2010/main" xmlns="">
+              <a14:hiddenEffects xmlns="" xmlns:a14="http://schemas.microsoft.com/office/drawing/2010/main">
                 <a:effectLst>
                   <a:outerShdw blurRad="63500" dist="38099" dir="2700000" algn="ctr" rotWithShape="0">
                     <a:srgbClr val="000000">
@@ -6410,14 +6410,14 @@
           <a:effectLst/>
           <a:extLst>
             <a:ext uri="{909E8E84-426E-40dd-AFC4-6F175D3DCCD1}">
-              <a14:hiddenFill xmlns:a14="http://schemas.microsoft.com/office/drawing/2010/main" xmlns="">
+              <a14:hiddenFill xmlns="" xmlns:a14="http://schemas.microsoft.com/office/drawing/2010/main">
                 <a:solidFill>
                   <a:schemeClr val="accent1"/>
                 </a:solidFill>
               </a14:hiddenFill>
             </a:ext>
             <a:ext uri="{91240B29-F687-4f45-9708-019B960494DF}">
-              <a14:hiddenLine xmlns:a14="http://schemas.microsoft.com/office/drawing/2010/main" xmlns="" w="9525" cap="flat" cmpd="sng" algn="ctr">
+              <a14:hiddenLine xmlns="" xmlns:a14="http://schemas.microsoft.com/office/drawing/2010/main" w="9525" cap="flat" cmpd="sng" algn="ctr">
                 <a:solidFill>
                   <a:schemeClr val="tx1"/>
                 </a:solidFill>
@@ -6428,7 +6428,7 @@
               </a14:hiddenLine>
             </a:ext>
             <a:ext uri="{AF507438-7753-43e0-B8FC-AC1667EBCBE1}">
-              <a14:hiddenEffects xmlns:a14="http://schemas.microsoft.com/office/drawing/2010/main" xmlns="">
+              <a14:hiddenEffects xmlns="" xmlns:a14="http://schemas.microsoft.com/office/drawing/2010/main">
                 <a:effectLst>
                   <a:outerShdw blurRad="63500" dist="38099" dir="2700000" algn="ctr" rotWithShape="0">
                     <a:srgbClr val="000000">
@@ -7608,31 +7608,35 @@
           </a:p>
         </p:txBody>
       </p:sp>
-      <p:sp>
-        <p:nvSpPr>
-          <p:cNvPr id="3" name="Segnaposto contenuto 2">
+      <p:pic>
+        <p:nvPicPr>
+          <p:cNvPr id="5" name="Segnaposto contenuto 4" descr="Immagine che contiene testo, diagramma, linea, Diagramma&#10;&#10;Descrizione generata automaticamente">
             <a:extLst>
               <a:ext uri="{FF2B5EF4-FFF2-40B4-BE49-F238E27FC236}">
-                <a16:creationId xmlns:a16="http://schemas.microsoft.com/office/drawing/2014/main" id="{894ED849-1807-F84E-D1C0-232B44606B52}"/>
+                <a16:creationId xmlns:a16="http://schemas.microsoft.com/office/drawing/2014/main" id="{E3B67003-5420-BA0A-25E7-C4609152943A}"/>
               </a:ext>
             </a:extLst>
           </p:cNvPr>
-          <p:cNvSpPr>
-            <a:spLocks noGrp="1"/>
-          </p:cNvSpPr>
+          <p:cNvPicPr>
+            <a:picLocks noGrp="1" noChangeAspect="1"/>
+          </p:cNvPicPr>
           <p:nvPr>
             <p:ph idx="1"/>
           </p:nvPr>
-        </p:nvSpPr>
-        <p:spPr/>
-        <p:txBody>
-          <a:bodyPr/>
-          <a:lstStyle/>
-          <a:p>
-            <a:endParaRPr lang="it-IT"/>
-          </a:p>
-        </p:txBody>
-      </p:sp>
+        </p:nvPicPr>
+        <p:blipFill>
+          <a:blip r:embed="rId2"/>
+          <a:stretch>
+            <a:fillRect/>
+          </a:stretch>
+        </p:blipFill>
+        <p:spPr>
+          <a:xfrm>
+            <a:off x="2086928" y="1752600"/>
+            <a:ext cx="5760720" cy="4114800"/>
+          </a:xfrm>
+        </p:spPr>
+      </p:pic>
     </p:spTree>
     <p:extLst>
       <p:ext uri="{BB962C8B-B14F-4D97-AF65-F5344CB8AC3E}">
@@ -7699,31 +7703,35 @@
           </a:p>
         </p:txBody>
       </p:sp>
-      <p:sp>
-        <p:nvSpPr>
-          <p:cNvPr id="3" name="Segnaposto contenuto 2">
+      <p:pic>
+        <p:nvPicPr>
+          <p:cNvPr id="5" name="Segnaposto contenuto 4" descr="Immagine che contiene testo, schermata, diagramma, linea&#10;&#10;Descrizione generata automaticamente">
             <a:extLst>
               <a:ext uri="{FF2B5EF4-FFF2-40B4-BE49-F238E27FC236}">
-                <a16:creationId xmlns:a16="http://schemas.microsoft.com/office/drawing/2014/main" id="{894ED849-1807-F84E-D1C0-232B44606B52}"/>
+                <a16:creationId xmlns:a16="http://schemas.microsoft.com/office/drawing/2014/main" id="{6B7AE0FA-395D-965F-5528-7DC70AD744F6}"/>
               </a:ext>
             </a:extLst>
           </p:cNvPr>
-          <p:cNvSpPr>
-            <a:spLocks noGrp="1"/>
-          </p:cNvSpPr>
+          <p:cNvPicPr>
+            <a:picLocks noGrp="1" noChangeAspect="1"/>
+          </p:cNvPicPr>
           <p:nvPr>
             <p:ph idx="1"/>
           </p:nvPr>
-        </p:nvSpPr>
-        <p:spPr/>
-        <p:txBody>
-          <a:bodyPr/>
-          <a:lstStyle/>
-          <a:p>
-            <a:endParaRPr lang="it-IT"/>
-          </a:p>
-        </p:txBody>
-      </p:sp>
+        </p:nvPicPr>
+        <p:blipFill>
+          <a:blip r:embed="rId2"/>
+          <a:stretch>
+            <a:fillRect/>
+          </a:stretch>
+        </p:blipFill>
+        <p:spPr>
+          <a:xfrm>
+            <a:off x="2086928" y="1752600"/>
+            <a:ext cx="5760720" cy="4114800"/>
+          </a:xfrm>
+        </p:spPr>
+      </p:pic>
     </p:spTree>
     <p:extLst>
       <p:ext uri="{BB962C8B-B14F-4D97-AF65-F5344CB8AC3E}">
@@ -7790,31 +7798,35 @@
           </a:p>
         </p:txBody>
       </p:sp>
-      <p:sp>
-        <p:nvSpPr>
-          <p:cNvPr id="3" name="Segnaposto contenuto 2">
+      <p:pic>
+        <p:nvPicPr>
+          <p:cNvPr id="5" name="Segnaposto contenuto 4" descr="Immagine che contiene testo, diagramma, linea, schermata&#10;&#10;Descrizione generata automaticamente">
             <a:extLst>
               <a:ext uri="{FF2B5EF4-FFF2-40B4-BE49-F238E27FC236}">
-                <a16:creationId xmlns:a16="http://schemas.microsoft.com/office/drawing/2014/main" id="{894ED849-1807-F84E-D1C0-232B44606B52}"/>
+                <a16:creationId xmlns:a16="http://schemas.microsoft.com/office/drawing/2014/main" id="{EF39AC31-A4A9-1D02-EBE5-F82AE87B8532}"/>
               </a:ext>
             </a:extLst>
           </p:cNvPr>
-          <p:cNvSpPr>
-            <a:spLocks noGrp="1"/>
-          </p:cNvSpPr>
+          <p:cNvPicPr>
+            <a:picLocks noGrp="1" noChangeAspect="1"/>
+          </p:cNvPicPr>
           <p:nvPr>
             <p:ph idx="1"/>
           </p:nvPr>
-        </p:nvSpPr>
-        <p:spPr/>
-        <p:txBody>
-          <a:bodyPr/>
-          <a:lstStyle/>
-          <a:p>
-            <a:endParaRPr lang="it-IT"/>
-          </a:p>
-        </p:txBody>
-      </p:sp>
+        </p:nvPicPr>
+        <p:blipFill>
+          <a:blip r:embed="rId2"/>
+          <a:stretch>
+            <a:fillRect/>
+          </a:stretch>
+        </p:blipFill>
+        <p:spPr>
+          <a:xfrm>
+            <a:off x="2086928" y="1752600"/>
+            <a:ext cx="5760720" cy="4114800"/>
+          </a:xfrm>
+        </p:spPr>
+      </p:pic>
     </p:spTree>
     <p:extLst>
       <p:ext uri="{BB962C8B-B14F-4D97-AF65-F5344CB8AC3E}">
@@ -7881,31 +7893,35 @@
           </a:p>
         </p:txBody>
       </p:sp>
-      <p:sp>
-        <p:nvSpPr>
-          <p:cNvPr id="3" name="Segnaposto contenuto 2">
+      <p:pic>
+        <p:nvPicPr>
+          <p:cNvPr id="5" name="Segnaposto contenuto 4" descr="Immagine che contiene testo, schermata, diagramma, linea&#10;&#10;Descrizione generata automaticamente">
             <a:extLst>
               <a:ext uri="{FF2B5EF4-FFF2-40B4-BE49-F238E27FC236}">
-                <a16:creationId xmlns:a16="http://schemas.microsoft.com/office/drawing/2014/main" id="{894ED849-1807-F84E-D1C0-232B44606B52}"/>
+                <a16:creationId xmlns:a16="http://schemas.microsoft.com/office/drawing/2014/main" id="{A70FF6A7-94DD-C1EA-4FC7-B57C6D15D6CF}"/>
               </a:ext>
             </a:extLst>
           </p:cNvPr>
-          <p:cNvSpPr>
-            <a:spLocks noGrp="1"/>
-          </p:cNvSpPr>
+          <p:cNvPicPr>
+            <a:picLocks noGrp="1" noChangeAspect="1"/>
+          </p:cNvPicPr>
           <p:nvPr>
             <p:ph idx="1"/>
           </p:nvPr>
-        </p:nvSpPr>
-        <p:spPr/>
-        <p:txBody>
-          <a:bodyPr/>
-          <a:lstStyle/>
-          <a:p>
-            <a:endParaRPr lang="it-IT"/>
-          </a:p>
-        </p:txBody>
-      </p:sp>
+        </p:nvPicPr>
+        <p:blipFill>
+          <a:blip r:embed="rId2"/>
+          <a:stretch>
+            <a:fillRect/>
+          </a:stretch>
+        </p:blipFill>
+        <p:spPr>
+          <a:xfrm>
+            <a:off x="2086928" y="1752600"/>
+            <a:ext cx="5760720" cy="4114800"/>
+          </a:xfrm>
+        </p:spPr>
+      </p:pic>
     </p:spTree>
     <p:extLst>
       <p:ext uri="{BB962C8B-B14F-4D97-AF65-F5344CB8AC3E}">
@@ -12114,14 +12130,14 @@
         <a:effectLst/>
         <a:extLst>
           <a:ext uri="{909E8E84-426E-40dd-AFC4-6F175D3DCCD1}">
-            <a14:hiddenFill xmlns="" xmlns:a14="http://schemas.microsoft.com/office/drawing/2010/main">
+            <a14:hiddenFill xmlns:a14="http://schemas.microsoft.com/office/drawing/2010/main" xmlns="">
               <a:solidFill>
                 <a:schemeClr val="accent1"/>
               </a:solidFill>
             </a14:hiddenFill>
           </a:ext>
           <a:ext uri="{91240B29-F687-4f45-9708-019B960494DF}">
-            <a14:hiddenLine xmlns="" xmlns:a14="http://schemas.microsoft.com/office/drawing/2010/main" w="9525" cap="flat" cmpd="sng" algn="ctr">
+            <a14:hiddenLine xmlns:a14="http://schemas.microsoft.com/office/drawing/2010/main" xmlns="" w="9525" cap="flat" cmpd="sng" algn="ctr">
               <a:solidFill>
                 <a:schemeClr val="tx1"/>
               </a:solidFill>
@@ -12132,7 +12148,7 @@
             </a14:hiddenLine>
           </a:ext>
           <a:ext uri="{AF507438-7753-43e0-B8FC-AC1667EBCBE1}">
-            <a14:hiddenEffects xmlns="" xmlns:a14="http://schemas.microsoft.com/office/drawing/2010/main">
+            <a14:hiddenEffects xmlns:a14="http://schemas.microsoft.com/office/drawing/2010/main" xmlns="">
               <a:effectLst>
                 <a:outerShdw blurRad="63500" dist="38099" dir="2700000" algn="ctr" rotWithShape="0">
                   <a:srgbClr val="000000">
@@ -12201,14 +12217,14 @@
         <a:effectLst/>
         <a:extLst>
           <a:ext uri="{909E8E84-426E-40dd-AFC4-6F175D3DCCD1}">
-            <a14:hiddenFill xmlns="" xmlns:a14="http://schemas.microsoft.com/office/drawing/2010/main">
+            <a14:hiddenFill xmlns:a14="http://schemas.microsoft.com/office/drawing/2010/main" xmlns="">
               <a:solidFill>
                 <a:schemeClr val="accent1"/>
               </a:solidFill>
             </a14:hiddenFill>
           </a:ext>
           <a:ext uri="{91240B29-F687-4f45-9708-019B960494DF}">
-            <a14:hiddenLine xmlns="" xmlns:a14="http://schemas.microsoft.com/office/drawing/2010/main" w="9525" cap="flat" cmpd="sng" algn="ctr">
+            <a14:hiddenLine xmlns:a14="http://schemas.microsoft.com/office/drawing/2010/main" xmlns="" w="9525" cap="flat" cmpd="sng" algn="ctr">
               <a:solidFill>
                 <a:schemeClr val="tx1"/>
               </a:solidFill>
@@ -12219,7 +12235,7 @@
             </a14:hiddenLine>
           </a:ext>
           <a:ext uri="{AF507438-7753-43e0-B8FC-AC1667EBCBE1}">
-            <a14:hiddenEffects xmlns="" xmlns:a14="http://schemas.microsoft.com/office/drawing/2010/main">
+            <a14:hiddenEffects xmlns:a14="http://schemas.microsoft.com/office/drawing/2010/main" xmlns="">
               <a:effectLst>
                 <a:outerShdw blurRad="63500" dist="38099" dir="2700000" algn="ctr" rotWithShape="0">
                   <a:srgbClr val="000000">

</xml_diff>

<commit_message>
Updated slides with LunarLander
</commit_message>
<xml_diff>
--- a/slides/diluccio_giamba_RL_project.pptx
+++ b/slides/diluccio_giamba_RL_project.pptx
@@ -5,10 +5,10 @@
     <p:sldMasterId id="2147483678" r:id="rId1"/>
   </p:sldMasterIdLst>
   <p:notesMasterIdLst>
-    <p:notesMasterId r:id="rId21"/>
+    <p:notesMasterId r:id="rId25"/>
   </p:notesMasterIdLst>
   <p:handoutMasterIdLst>
-    <p:handoutMasterId r:id="rId22"/>
+    <p:handoutMasterId r:id="rId26"/>
   </p:handoutMasterIdLst>
   <p:sldIdLst>
     <p:sldId id="276" r:id="rId2"/>
@@ -22,14 +22,18 @@
     <p:sldId id="298" r:id="rId10"/>
     <p:sldId id="296" r:id="rId11"/>
     <p:sldId id="304" r:id="rId12"/>
-    <p:sldId id="305" r:id="rId13"/>
-    <p:sldId id="306" r:id="rId14"/>
-    <p:sldId id="307" r:id="rId15"/>
-    <p:sldId id="308" r:id="rId16"/>
-    <p:sldId id="309" r:id="rId17"/>
-    <p:sldId id="310" r:id="rId18"/>
-    <p:sldId id="291" r:id="rId19"/>
-    <p:sldId id="294" r:id="rId20"/>
+    <p:sldId id="311" r:id="rId13"/>
+    <p:sldId id="312" r:id="rId14"/>
+    <p:sldId id="313" r:id="rId15"/>
+    <p:sldId id="305" r:id="rId16"/>
+    <p:sldId id="306" r:id="rId17"/>
+    <p:sldId id="307" r:id="rId18"/>
+    <p:sldId id="308" r:id="rId19"/>
+    <p:sldId id="309" r:id="rId20"/>
+    <p:sldId id="314" r:id="rId21"/>
+    <p:sldId id="315" r:id="rId22"/>
+    <p:sldId id="310" r:id="rId23"/>
+    <p:sldId id="291" r:id="rId24"/>
   </p:sldIdLst>
   <p:sldSz cx="9144000" cy="6858000" type="screen4x3"/>
   <p:notesSz cx="6858000" cy="9144000"/>
@@ -2055,7 +2059,7 @@
                 <a:latin typeface="Calibri" panose="020F0502020204030204" pitchFamily="34" charset="0"/>
               </a:rPr>
               <a:pPr/>
-              <a:t>18</a:t>
+              <a:t>23</a:t>
             </a:fld>
             <a:endParaRPr lang="it-IT" altLang="it-IT" sz="1200">
               <a:solidFill>
@@ -6314,14 +6318,14 @@
           <a:effectLst/>
           <a:extLst>
             <a:ext uri="{909E8E84-426E-40dd-AFC4-6F175D3DCCD1}">
-              <a14:hiddenFill xmlns="" xmlns:a14="http://schemas.microsoft.com/office/drawing/2010/main">
+              <a14:hiddenFill xmlns:a14="http://schemas.microsoft.com/office/drawing/2010/main" xmlns="">
                 <a:solidFill>
                   <a:schemeClr val="accent1"/>
                 </a:solidFill>
               </a14:hiddenFill>
             </a:ext>
             <a:ext uri="{91240B29-F687-4f45-9708-019B960494DF}">
-              <a14:hiddenLine xmlns="" xmlns:a14="http://schemas.microsoft.com/office/drawing/2010/main" w="9525" cap="flat" cmpd="sng" algn="ctr">
+              <a14:hiddenLine xmlns:a14="http://schemas.microsoft.com/office/drawing/2010/main" xmlns="" w="9525" cap="flat" cmpd="sng" algn="ctr">
                 <a:solidFill>
                   <a:schemeClr val="tx1"/>
                 </a:solidFill>
@@ -6332,7 +6336,7 @@
               </a14:hiddenLine>
             </a:ext>
             <a:ext uri="{AF507438-7753-43e0-B8FC-AC1667EBCBE1}">
-              <a14:hiddenEffects xmlns="" xmlns:a14="http://schemas.microsoft.com/office/drawing/2010/main">
+              <a14:hiddenEffects xmlns:a14="http://schemas.microsoft.com/office/drawing/2010/main" xmlns="">
                 <a:effectLst>
                   <a:outerShdw blurRad="63500" dist="38099" dir="2700000" algn="ctr" rotWithShape="0">
                     <a:srgbClr val="000000">
@@ -6410,14 +6414,14 @@
           <a:effectLst/>
           <a:extLst>
             <a:ext uri="{909E8E84-426E-40dd-AFC4-6F175D3DCCD1}">
-              <a14:hiddenFill xmlns="" xmlns:a14="http://schemas.microsoft.com/office/drawing/2010/main">
+              <a14:hiddenFill xmlns:a14="http://schemas.microsoft.com/office/drawing/2010/main" xmlns="">
                 <a:solidFill>
                   <a:schemeClr val="accent1"/>
                 </a:solidFill>
               </a14:hiddenFill>
             </a:ext>
             <a:ext uri="{91240B29-F687-4f45-9708-019B960494DF}">
-              <a14:hiddenLine xmlns="" xmlns:a14="http://schemas.microsoft.com/office/drawing/2010/main" w="9525" cap="flat" cmpd="sng" algn="ctr">
+              <a14:hiddenLine xmlns:a14="http://schemas.microsoft.com/office/drawing/2010/main" xmlns="" w="9525" cap="flat" cmpd="sng" algn="ctr">
                 <a:solidFill>
                   <a:schemeClr val="tx1"/>
                 </a:solidFill>
@@ -6428,7 +6432,7 @@
               </a14:hiddenLine>
             </a:ext>
             <a:ext uri="{AF507438-7753-43e0-B8FC-AC1667EBCBE1}">
-              <a14:hiddenEffects xmlns="" xmlns:a14="http://schemas.microsoft.com/office/drawing/2010/main">
+              <a14:hiddenEffects xmlns:a14="http://schemas.microsoft.com/office/drawing/2010/main" xmlns="">
                 <a:effectLst>
                   <a:outerShdw blurRad="63500" dist="38099" dir="2700000" algn="ctr" rotWithShape="0">
                     <a:srgbClr val="000000">
@@ -7286,7 +7290,7 @@
               <a:rPr lang="en-GB" altLang="it-IT" dirty="0">
                 <a:latin typeface="Calibri" panose="020F0502020204030204" pitchFamily="34" charset="0"/>
               </a:rPr>
-              <a:t>IBP (8) – Training algorithms: gradients </a:t>
+              <a:t>IBP (8) – Training algorithm: gradients </a:t>
             </a:r>
           </a:p>
         </p:txBody>
@@ -7317,12 +7321,72 @@
               <a:buChar char="Ø"/>
             </a:pPr>
             <a:r>
+              <a:rPr lang="en-GB" altLang="it-IT" dirty="0">
+                <a:latin typeface="Calibri" panose="020F0502020204030204" pitchFamily="34" charset="0"/>
+              </a:rPr>
+              <a:t>The paper </a:t>
+            </a:r>
+            <a:r>
               <a:rPr lang="en-GB" altLang="it-IT" b="1" dirty="0">
                 <a:latin typeface="Calibri" panose="020F0502020204030204" pitchFamily="34" charset="0"/>
               </a:rPr>
-              <a:t>??</a:t>
-            </a:r>
-            <a:endParaRPr lang="en-GB" altLang="it-IT" sz="2400" dirty="0">
+              <a:t>doesn’t clearly specify</a:t>
+            </a:r>
+            <a:r>
+              <a:rPr lang="en-GB" altLang="it-IT" dirty="0">
+                <a:latin typeface="Calibri" panose="020F0502020204030204" pitchFamily="34" charset="0"/>
+              </a:rPr>
+              <a:t> how to build a </a:t>
+            </a:r>
+            <a:r>
+              <a:rPr lang="en-GB" altLang="it-IT" b="1" dirty="0">
+                <a:latin typeface="Calibri" panose="020F0502020204030204" pitchFamily="34" charset="0"/>
+              </a:rPr>
+              <a:t>backward computation graph</a:t>
+            </a:r>
+            <a:r>
+              <a:rPr lang="en-GB" altLang="it-IT" dirty="0">
+                <a:latin typeface="Calibri" panose="020F0502020204030204" pitchFamily="34" charset="0"/>
+              </a:rPr>
+              <a:t> for </a:t>
+            </a:r>
+            <a:r>
+              <a:rPr lang="en-GB" altLang="it-IT" b="1" dirty="0">
+                <a:latin typeface="Calibri" panose="020F0502020204030204" pitchFamily="34" charset="0"/>
+              </a:rPr>
+              <a:t>gradients computation</a:t>
+            </a:r>
+            <a:r>
+              <a:rPr lang="en-GB" altLang="it-IT" dirty="0">
+                <a:latin typeface="Calibri" panose="020F0502020204030204" pitchFamily="34" charset="0"/>
+              </a:rPr>
+              <a:t>.</a:t>
+            </a:r>
+          </a:p>
+          <a:p>
+            <a:pPr>
+              <a:buFont typeface="Wingdings" panose="05000000000000000000" pitchFamily="2" charset="2"/>
+              <a:buChar char="Ø"/>
+            </a:pPr>
+            <a:r>
+              <a:rPr lang="en-GB" altLang="it-IT" dirty="0">
+                <a:latin typeface="Calibri" panose="020F0502020204030204" pitchFamily="34" charset="0"/>
+              </a:rPr>
+              <a:t>The one in the code is an implementation based on our understanding of how things </a:t>
+            </a:r>
+            <a:r>
+              <a:rPr lang="en-GB" altLang="it-IT" b="1" dirty="0">
+                <a:latin typeface="Calibri" panose="020F0502020204030204" pitchFamily="34" charset="0"/>
+              </a:rPr>
+              <a:t>should be</a:t>
+            </a:r>
+            <a:r>
+              <a:rPr lang="en-GB" altLang="it-IT" dirty="0">
+                <a:latin typeface="Calibri" panose="020F0502020204030204" pitchFamily="34" charset="0"/>
+              </a:rPr>
+              <a:t>.</a:t>
+            </a:r>
+            <a:endParaRPr lang="en-GB" altLang="it-IT" sz="2400" b="1" dirty="0">
               <a:latin typeface="Calibri" panose="020F0502020204030204" pitchFamily="34" charset="0"/>
             </a:endParaRPr>
           </a:p>
@@ -7342,6 +7406,291 @@
 </file>
 
 <file path=ppt/slides/slide12.xml><?xml version="1.0" encoding="utf-8"?>
+<p:sld xmlns:a="http://schemas.openxmlformats.org/drawingml/2006/main" xmlns:r="http://schemas.openxmlformats.org/officeDocument/2006/relationships" xmlns:p="http://schemas.openxmlformats.org/presentationml/2006/main">
+  <p:cSld>
+    <p:spTree>
+      <p:nvGrpSpPr>
+        <p:cNvPr id="1" name=""/>
+        <p:cNvGrpSpPr/>
+        <p:nvPr/>
+      </p:nvGrpSpPr>
+      <p:grpSpPr>
+        <a:xfrm>
+          <a:off x="0" y="0"/>
+          <a:ext cx="0" cy="0"/>
+          <a:chOff x="0" y="0"/>
+          <a:chExt cx="0" cy="0"/>
+        </a:xfrm>
+      </p:grpSpPr>
+      <p:sp>
+        <p:nvSpPr>
+          <p:cNvPr id="2" name="Titolo 1">
+            <a:extLst>
+              <a:ext uri="{FF2B5EF4-FFF2-40B4-BE49-F238E27FC236}">
+                <a16:creationId xmlns:a16="http://schemas.microsoft.com/office/drawing/2014/main" id="{A142BAAD-D6AF-188C-9255-72DD25CF46B1}"/>
+              </a:ext>
+            </a:extLst>
+          </p:cNvPr>
+          <p:cNvSpPr>
+            <a:spLocks noGrp="1"/>
+          </p:cNvSpPr>
+          <p:nvPr>
+            <p:ph type="title"/>
+          </p:nvPr>
+        </p:nvSpPr>
+        <p:spPr/>
+        <p:txBody>
+          <a:bodyPr/>
+          <a:lstStyle/>
+          <a:p>
+            <a:r>
+              <a:rPr lang="it-IT" dirty="0"/>
+              <a:t>IBP (9) – </a:t>
+            </a:r>
+            <a:r>
+              <a:rPr lang="it-IT" dirty="0" err="1"/>
+              <a:t>Gradients</a:t>
+            </a:r>
+            <a:r>
+              <a:rPr lang="it-IT" dirty="0"/>
+              <a:t> for «Act»</a:t>
+            </a:r>
+          </a:p>
+        </p:txBody>
+      </p:sp>
+      <p:pic>
+        <p:nvPicPr>
+          <p:cNvPr id="5" name="Segnaposto contenuto 4" descr="Immagine che contiene diagramma, linea, testo, Piano&#10;&#10;Descrizione generata automaticamente">
+            <a:extLst>
+              <a:ext uri="{FF2B5EF4-FFF2-40B4-BE49-F238E27FC236}">
+                <a16:creationId xmlns:a16="http://schemas.microsoft.com/office/drawing/2014/main" id="{A1DD3B7B-1A2C-8FBC-D043-BC8E3BBCFF76}"/>
+              </a:ext>
+            </a:extLst>
+          </p:cNvPr>
+          <p:cNvPicPr>
+            <a:picLocks noGrp="1" noChangeAspect="1"/>
+          </p:cNvPicPr>
+          <p:nvPr>
+            <p:ph idx="1"/>
+          </p:nvPr>
+        </p:nvPicPr>
+        <p:blipFill>
+          <a:blip r:embed="rId2"/>
+          <a:stretch>
+            <a:fillRect/>
+          </a:stretch>
+        </p:blipFill>
+        <p:spPr>
+          <a:xfrm>
+            <a:off x="2367550" y="1752600"/>
+            <a:ext cx="5199475" cy="4114800"/>
+          </a:xfrm>
+        </p:spPr>
+      </p:pic>
+    </p:spTree>
+    <p:extLst>
+      <p:ext uri="{BB962C8B-B14F-4D97-AF65-F5344CB8AC3E}">
+        <p14:creationId xmlns:p14="http://schemas.microsoft.com/office/powerpoint/2010/main" val="3561177086"/>
+      </p:ext>
+    </p:extLst>
+  </p:cSld>
+  <p:clrMapOvr>
+    <a:masterClrMapping/>
+  </p:clrMapOvr>
+</p:sld>
+</file>
+
+<file path=ppt/slides/slide13.xml><?xml version="1.0" encoding="utf-8"?>
+<p:sld xmlns:a="http://schemas.openxmlformats.org/drawingml/2006/main" xmlns:r="http://schemas.openxmlformats.org/officeDocument/2006/relationships" xmlns:p="http://schemas.openxmlformats.org/presentationml/2006/main">
+  <p:cSld>
+    <p:spTree>
+      <p:nvGrpSpPr>
+        <p:cNvPr id="1" name=""/>
+        <p:cNvGrpSpPr/>
+        <p:nvPr/>
+      </p:nvGrpSpPr>
+      <p:grpSpPr>
+        <a:xfrm>
+          <a:off x="0" y="0"/>
+          <a:ext cx="0" cy="0"/>
+          <a:chOff x="0" y="0"/>
+          <a:chExt cx="0" cy="0"/>
+        </a:xfrm>
+      </p:grpSpPr>
+      <p:sp>
+        <p:nvSpPr>
+          <p:cNvPr id="2" name="Titolo 1">
+            <a:extLst>
+              <a:ext uri="{FF2B5EF4-FFF2-40B4-BE49-F238E27FC236}">
+                <a16:creationId xmlns:a16="http://schemas.microsoft.com/office/drawing/2014/main" id="{A142BAAD-D6AF-188C-9255-72DD25CF46B1}"/>
+              </a:ext>
+            </a:extLst>
+          </p:cNvPr>
+          <p:cNvSpPr>
+            <a:spLocks noGrp="1"/>
+          </p:cNvSpPr>
+          <p:nvPr>
+            <p:ph type="title"/>
+          </p:nvPr>
+        </p:nvSpPr>
+        <p:spPr/>
+        <p:txBody>
+          <a:bodyPr/>
+          <a:lstStyle/>
+          <a:p>
+            <a:r>
+              <a:rPr lang="it-IT" dirty="0"/>
+              <a:t>IBP (10) – </a:t>
+            </a:r>
+            <a:r>
+              <a:rPr lang="it-IT" dirty="0" err="1"/>
+              <a:t>Gradients</a:t>
+            </a:r>
+            <a:r>
+              <a:rPr lang="it-IT" dirty="0"/>
+              <a:t> for «Imag1»</a:t>
+            </a:r>
+          </a:p>
+        </p:txBody>
+      </p:sp>
+      <p:pic>
+        <p:nvPicPr>
+          <p:cNvPr id="6" name="Segnaposto contenuto 5" descr="Immagine che contiene diagramma, testo, linea&#10;&#10;Descrizione generata automaticamente">
+            <a:extLst>
+              <a:ext uri="{FF2B5EF4-FFF2-40B4-BE49-F238E27FC236}">
+                <a16:creationId xmlns:a16="http://schemas.microsoft.com/office/drawing/2014/main" id="{B78BDBC2-0D3F-A87F-780F-32F2E44C111C}"/>
+              </a:ext>
+            </a:extLst>
+          </p:cNvPr>
+          <p:cNvPicPr>
+            <a:picLocks noGrp="1" noChangeAspect="1"/>
+          </p:cNvPicPr>
+          <p:nvPr>
+            <p:ph idx="1"/>
+          </p:nvPr>
+        </p:nvPicPr>
+        <p:blipFill>
+          <a:blip r:embed="rId2"/>
+          <a:stretch>
+            <a:fillRect/>
+          </a:stretch>
+        </p:blipFill>
+        <p:spPr>
+          <a:xfrm>
+            <a:off x="2889986" y="1752600"/>
+            <a:ext cx="4154604" cy="4114800"/>
+          </a:xfrm>
+        </p:spPr>
+      </p:pic>
+    </p:spTree>
+    <p:extLst>
+      <p:ext uri="{BB962C8B-B14F-4D97-AF65-F5344CB8AC3E}">
+        <p14:creationId xmlns:p14="http://schemas.microsoft.com/office/powerpoint/2010/main" val="1762439115"/>
+      </p:ext>
+    </p:extLst>
+  </p:cSld>
+  <p:clrMapOvr>
+    <a:masterClrMapping/>
+  </p:clrMapOvr>
+</p:sld>
+</file>
+
+<file path=ppt/slides/slide14.xml><?xml version="1.0" encoding="utf-8"?>
+<p:sld xmlns:a="http://schemas.openxmlformats.org/drawingml/2006/main" xmlns:r="http://schemas.openxmlformats.org/officeDocument/2006/relationships" xmlns:p="http://schemas.openxmlformats.org/presentationml/2006/main">
+  <p:cSld>
+    <p:spTree>
+      <p:nvGrpSpPr>
+        <p:cNvPr id="1" name=""/>
+        <p:cNvGrpSpPr/>
+        <p:nvPr/>
+      </p:nvGrpSpPr>
+      <p:grpSpPr>
+        <a:xfrm>
+          <a:off x="0" y="0"/>
+          <a:ext cx="0" cy="0"/>
+          <a:chOff x="0" y="0"/>
+          <a:chExt cx="0" cy="0"/>
+        </a:xfrm>
+      </p:grpSpPr>
+      <p:sp>
+        <p:nvSpPr>
+          <p:cNvPr id="2" name="Titolo 1">
+            <a:extLst>
+              <a:ext uri="{FF2B5EF4-FFF2-40B4-BE49-F238E27FC236}">
+                <a16:creationId xmlns:a16="http://schemas.microsoft.com/office/drawing/2014/main" id="{A142BAAD-D6AF-188C-9255-72DD25CF46B1}"/>
+              </a:ext>
+            </a:extLst>
+          </p:cNvPr>
+          <p:cNvSpPr>
+            <a:spLocks noGrp="1"/>
+          </p:cNvSpPr>
+          <p:nvPr>
+            <p:ph type="title"/>
+          </p:nvPr>
+        </p:nvSpPr>
+        <p:spPr/>
+        <p:txBody>
+          <a:bodyPr/>
+          <a:lstStyle/>
+          <a:p>
+            <a:r>
+              <a:rPr lang="it-IT" dirty="0"/>
+              <a:t>IBP (11) – </a:t>
+            </a:r>
+            <a:r>
+              <a:rPr lang="it-IT" dirty="0" err="1"/>
+              <a:t>Gradients</a:t>
+            </a:r>
+            <a:r>
+              <a:rPr lang="it-IT" dirty="0"/>
+              <a:t> for «Imag2»</a:t>
+            </a:r>
+          </a:p>
+        </p:txBody>
+      </p:sp>
+      <p:pic>
+        <p:nvPicPr>
+          <p:cNvPr id="5" name="Segnaposto contenuto 4" descr="Immagine che contiene diagramma, linea, testo&#10;&#10;Descrizione generata automaticamente">
+            <a:extLst>
+              <a:ext uri="{FF2B5EF4-FFF2-40B4-BE49-F238E27FC236}">
+                <a16:creationId xmlns:a16="http://schemas.microsoft.com/office/drawing/2014/main" id="{71444CE8-B8B8-C095-310F-14A1469334F7}"/>
+              </a:ext>
+            </a:extLst>
+          </p:cNvPr>
+          <p:cNvPicPr>
+            <a:picLocks noGrp="1" noChangeAspect="1"/>
+          </p:cNvPicPr>
+          <p:nvPr>
+            <p:ph idx="1"/>
+          </p:nvPr>
+        </p:nvPicPr>
+        <p:blipFill>
+          <a:blip r:embed="rId2"/>
+          <a:stretch>
+            <a:fillRect/>
+          </a:stretch>
+        </p:blipFill>
+        <p:spPr>
+          <a:xfrm>
+            <a:off x="3138764" y="1752600"/>
+            <a:ext cx="3657047" cy="4114800"/>
+          </a:xfrm>
+        </p:spPr>
+      </p:pic>
+    </p:spTree>
+    <p:extLst>
+      <p:ext uri="{BB962C8B-B14F-4D97-AF65-F5344CB8AC3E}">
+        <p14:creationId xmlns:p14="http://schemas.microsoft.com/office/powerpoint/2010/main" val="74196635"/>
+      </p:ext>
+    </p:extLst>
+  </p:cSld>
+  <p:clrMapOvr>
+    <a:masterClrMapping/>
+  </p:clrMapOvr>
+</p:sld>
+</file>
+
+<file path=ppt/slides/slide15.xml><?xml version="1.0" encoding="utf-8"?>
 <p:sld xmlns:a="http://schemas.openxmlformats.org/drawingml/2006/main" xmlns:r="http://schemas.openxmlformats.org/officeDocument/2006/relationships" xmlns:p="http://schemas.openxmlformats.org/presentationml/2006/main">
   <p:cSld>
     <p:spTree>
@@ -7546,291 +7895,6 @@
     <p:extLst>
       <p:ext uri="{BB962C8B-B14F-4D97-AF65-F5344CB8AC3E}">
         <p14:creationId xmlns:p14="http://schemas.microsoft.com/office/powerpoint/2010/main" val="2335632392"/>
-      </p:ext>
-    </p:extLst>
-  </p:cSld>
-  <p:clrMapOvr>
-    <a:masterClrMapping/>
-  </p:clrMapOvr>
-</p:sld>
-</file>
-
-<file path=ppt/slides/slide13.xml><?xml version="1.0" encoding="utf-8"?>
-<p:sld xmlns:a="http://schemas.openxmlformats.org/drawingml/2006/main" xmlns:r="http://schemas.openxmlformats.org/officeDocument/2006/relationships" xmlns:p="http://schemas.openxmlformats.org/presentationml/2006/main">
-  <p:cSld>
-    <p:spTree>
-      <p:nvGrpSpPr>
-        <p:cNvPr id="1" name=""/>
-        <p:cNvGrpSpPr/>
-        <p:nvPr/>
-      </p:nvGrpSpPr>
-      <p:grpSpPr>
-        <a:xfrm>
-          <a:off x="0" y="0"/>
-          <a:ext cx="0" cy="0"/>
-          <a:chOff x="0" y="0"/>
-          <a:chExt cx="0" cy="0"/>
-        </a:xfrm>
-      </p:grpSpPr>
-      <p:sp>
-        <p:nvSpPr>
-          <p:cNvPr id="2" name="Titolo 1">
-            <a:extLst>
-              <a:ext uri="{FF2B5EF4-FFF2-40B4-BE49-F238E27FC236}">
-                <a16:creationId xmlns:a16="http://schemas.microsoft.com/office/drawing/2014/main" id="{D1A8308D-53B7-EAC7-9059-D4934216E56F}"/>
-              </a:ext>
-            </a:extLst>
-          </p:cNvPr>
-          <p:cNvSpPr>
-            <a:spLocks noGrp="1"/>
-          </p:cNvSpPr>
-          <p:nvPr>
-            <p:ph type="title"/>
-          </p:nvPr>
-        </p:nvSpPr>
-        <p:spPr/>
-        <p:txBody>
-          <a:bodyPr/>
-          <a:lstStyle/>
-          <a:p>
-            <a:r>
-              <a:rPr lang="it-IT" dirty="0"/>
-              <a:t>Experiment 1: </a:t>
-            </a:r>
-            <a:r>
-              <a:rPr lang="it-IT" dirty="0" err="1"/>
-              <a:t>CartPole</a:t>
-            </a:r>
-            <a:r>
-              <a:rPr lang="it-IT" dirty="0"/>
-              <a:t> (1) – Training</a:t>
-            </a:r>
-          </a:p>
-        </p:txBody>
-      </p:sp>
-      <p:pic>
-        <p:nvPicPr>
-          <p:cNvPr id="5" name="Segnaposto contenuto 4" descr="Immagine che contiene testo, diagramma, linea, Diagramma&#10;&#10;Descrizione generata automaticamente">
-            <a:extLst>
-              <a:ext uri="{FF2B5EF4-FFF2-40B4-BE49-F238E27FC236}">
-                <a16:creationId xmlns:a16="http://schemas.microsoft.com/office/drawing/2014/main" id="{E3B67003-5420-BA0A-25E7-C4609152943A}"/>
-              </a:ext>
-            </a:extLst>
-          </p:cNvPr>
-          <p:cNvPicPr>
-            <a:picLocks noGrp="1" noChangeAspect="1"/>
-          </p:cNvPicPr>
-          <p:nvPr>
-            <p:ph idx="1"/>
-          </p:nvPr>
-        </p:nvPicPr>
-        <p:blipFill>
-          <a:blip r:embed="rId2"/>
-          <a:stretch>
-            <a:fillRect/>
-          </a:stretch>
-        </p:blipFill>
-        <p:spPr>
-          <a:xfrm>
-            <a:off x="2086928" y="1752600"/>
-            <a:ext cx="5760720" cy="4114800"/>
-          </a:xfrm>
-        </p:spPr>
-      </p:pic>
-    </p:spTree>
-    <p:extLst>
-      <p:ext uri="{BB962C8B-B14F-4D97-AF65-F5344CB8AC3E}">
-        <p14:creationId xmlns:p14="http://schemas.microsoft.com/office/powerpoint/2010/main" val="2576134013"/>
-      </p:ext>
-    </p:extLst>
-  </p:cSld>
-  <p:clrMapOvr>
-    <a:masterClrMapping/>
-  </p:clrMapOvr>
-</p:sld>
-</file>
-
-<file path=ppt/slides/slide14.xml><?xml version="1.0" encoding="utf-8"?>
-<p:sld xmlns:a="http://schemas.openxmlformats.org/drawingml/2006/main" xmlns:r="http://schemas.openxmlformats.org/officeDocument/2006/relationships" xmlns:p="http://schemas.openxmlformats.org/presentationml/2006/main">
-  <p:cSld>
-    <p:spTree>
-      <p:nvGrpSpPr>
-        <p:cNvPr id="1" name=""/>
-        <p:cNvGrpSpPr/>
-        <p:nvPr/>
-      </p:nvGrpSpPr>
-      <p:grpSpPr>
-        <a:xfrm>
-          <a:off x="0" y="0"/>
-          <a:ext cx="0" cy="0"/>
-          <a:chOff x="0" y="0"/>
-          <a:chExt cx="0" cy="0"/>
-        </a:xfrm>
-      </p:grpSpPr>
-      <p:sp>
-        <p:nvSpPr>
-          <p:cNvPr id="2" name="Titolo 1">
-            <a:extLst>
-              <a:ext uri="{FF2B5EF4-FFF2-40B4-BE49-F238E27FC236}">
-                <a16:creationId xmlns:a16="http://schemas.microsoft.com/office/drawing/2014/main" id="{D1A8308D-53B7-EAC7-9059-D4934216E56F}"/>
-              </a:ext>
-            </a:extLst>
-          </p:cNvPr>
-          <p:cNvSpPr>
-            <a:spLocks noGrp="1"/>
-          </p:cNvSpPr>
-          <p:nvPr>
-            <p:ph type="title"/>
-          </p:nvPr>
-        </p:nvSpPr>
-        <p:spPr/>
-        <p:txBody>
-          <a:bodyPr/>
-          <a:lstStyle/>
-          <a:p>
-            <a:r>
-              <a:rPr lang="it-IT" dirty="0"/>
-              <a:t>Experiment 1: </a:t>
-            </a:r>
-            <a:r>
-              <a:rPr lang="it-IT" dirty="0" err="1"/>
-              <a:t>CartPole</a:t>
-            </a:r>
-            <a:r>
-              <a:rPr lang="it-IT" dirty="0"/>
-              <a:t> (2) – Evaluation</a:t>
-            </a:r>
-          </a:p>
-        </p:txBody>
-      </p:sp>
-      <p:pic>
-        <p:nvPicPr>
-          <p:cNvPr id="5" name="Segnaposto contenuto 4" descr="Immagine che contiene testo, schermata, diagramma, linea&#10;&#10;Descrizione generata automaticamente">
-            <a:extLst>
-              <a:ext uri="{FF2B5EF4-FFF2-40B4-BE49-F238E27FC236}">
-                <a16:creationId xmlns:a16="http://schemas.microsoft.com/office/drawing/2014/main" id="{6B7AE0FA-395D-965F-5528-7DC70AD744F6}"/>
-              </a:ext>
-            </a:extLst>
-          </p:cNvPr>
-          <p:cNvPicPr>
-            <a:picLocks noGrp="1" noChangeAspect="1"/>
-          </p:cNvPicPr>
-          <p:nvPr>
-            <p:ph idx="1"/>
-          </p:nvPr>
-        </p:nvPicPr>
-        <p:blipFill>
-          <a:blip r:embed="rId2"/>
-          <a:stretch>
-            <a:fillRect/>
-          </a:stretch>
-        </p:blipFill>
-        <p:spPr>
-          <a:xfrm>
-            <a:off x="2086928" y="1752600"/>
-            <a:ext cx="5760720" cy="4114800"/>
-          </a:xfrm>
-        </p:spPr>
-      </p:pic>
-    </p:spTree>
-    <p:extLst>
-      <p:ext uri="{BB962C8B-B14F-4D97-AF65-F5344CB8AC3E}">
-        <p14:creationId xmlns:p14="http://schemas.microsoft.com/office/powerpoint/2010/main" val="368020728"/>
-      </p:ext>
-    </p:extLst>
-  </p:cSld>
-  <p:clrMapOvr>
-    <a:masterClrMapping/>
-  </p:clrMapOvr>
-</p:sld>
-</file>
-
-<file path=ppt/slides/slide15.xml><?xml version="1.0" encoding="utf-8"?>
-<p:sld xmlns:a="http://schemas.openxmlformats.org/drawingml/2006/main" xmlns:r="http://schemas.openxmlformats.org/officeDocument/2006/relationships" xmlns:p="http://schemas.openxmlformats.org/presentationml/2006/main">
-  <p:cSld>
-    <p:spTree>
-      <p:nvGrpSpPr>
-        <p:cNvPr id="1" name=""/>
-        <p:cNvGrpSpPr/>
-        <p:nvPr/>
-      </p:nvGrpSpPr>
-      <p:grpSpPr>
-        <a:xfrm>
-          <a:off x="0" y="0"/>
-          <a:ext cx="0" cy="0"/>
-          <a:chOff x="0" y="0"/>
-          <a:chExt cx="0" cy="0"/>
-        </a:xfrm>
-      </p:grpSpPr>
-      <p:sp>
-        <p:nvSpPr>
-          <p:cNvPr id="2" name="Titolo 1">
-            <a:extLst>
-              <a:ext uri="{FF2B5EF4-FFF2-40B4-BE49-F238E27FC236}">
-                <a16:creationId xmlns:a16="http://schemas.microsoft.com/office/drawing/2014/main" id="{D1A8308D-53B7-EAC7-9059-D4934216E56F}"/>
-              </a:ext>
-            </a:extLst>
-          </p:cNvPr>
-          <p:cNvSpPr>
-            <a:spLocks noGrp="1"/>
-          </p:cNvSpPr>
-          <p:nvPr>
-            <p:ph type="title"/>
-          </p:nvPr>
-        </p:nvSpPr>
-        <p:spPr/>
-        <p:txBody>
-          <a:bodyPr/>
-          <a:lstStyle/>
-          <a:p>
-            <a:r>
-              <a:rPr lang="it-IT" dirty="0"/>
-              <a:t>Experiment 2: </a:t>
-            </a:r>
-            <a:r>
-              <a:rPr lang="it-IT" dirty="0" err="1"/>
-              <a:t>FrozenLake</a:t>
-            </a:r>
-            <a:r>
-              <a:rPr lang="it-IT" dirty="0"/>
-              <a:t> (1) – Training</a:t>
-            </a:r>
-          </a:p>
-        </p:txBody>
-      </p:sp>
-      <p:pic>
-        <p:nvPicPr>
-          <p:cNvPr id="5" name="Segnaposto contenuto 4" descr="Immagine che contiene testo, diagramma, linea, schermata&#10;&#10;Descrizione generata automaticamente">
-            <a:extLst>
-              <a:ext uri="{FF2B5EF4-FFF2-40B4-BE49-F238E27FC236}">
-                <a16:creationId xmlns:a16="http://schemas.microsoft.com/office/drawing/2014/main" id="{EF39AC31-A4A9-1D02-EBE5-F82AE87B8532}"/>
-              </a:ext>
-            </a:extLst>
-          </p:cNvPr>
-          <p:cNvPicPr>
-            <a:picLocks noGrp="1" noChangeAspect="1"/>
-          </p:cNvPicPr>
-          <p:nvPr>
-            <p:ph idx="1"/>
-          </p:nvPr>
-        </p:nvPicPr>
-        <p:blipFill>
-          <a:blip r:embed="rId2"/>
-          <a:stretch>
-            <a:fillRect/>
-          </a:stretch>
-        </p:blipFill>
-        <p:spPr>
-          <a:xfrm>
-            <a:off x="2086928" y="1752600"/>
-            <a:ext cx="5760720" cy="4114800"/>
-          </a:xfrm>
-        </p:spPr>
-      </p:pic>
-    </p:spTree>
-    <p:extLst>
-      <p:ext uri="{BB962C8B-B14F-4D97-AF65-F5344CB8AC3E}">
-        <p14:creationId xmlns:p14="http://schemas.microsoft.com/office/powerpoint/2010/main" val="3068131647"/>
       </p:ext>
     </p:extLst>
   </p:cSld>
@@ -7880,6 +7944,291 @@
           <a:p>
             <a:r>
               <a:rPr lang="it-IT" dirty="0"/>
+              <a:t>Experiment 1: </a:t>
+            </a:r>
+            <a:r>
+              <a:rPr lang="it-IT" dirty="0" err="1"/>
+              <a:t>CartPole</a:t>
+            </a:r>
+            <a:r>
+              <a:rPr lang="it-IT" dirty="0"/>
+              <a:t> (1) – Training</a:t>
+            </a:r>
+          </a:p>
+        </p:txBody>
+      </p:sp>
+      <p:pic>
+        <p:nvPicPr>
+          <p:cNvPr id="5" name="Segnaposto contenuto 4" descr="Immagine che contiene testo, diagramma, linea, Diagramma&#10;&#10;Descrizione generata automaticamente">
+            <a:extLst>
+              <a:ext uri="{FF2B5EF4-FFF2-40B4-BE49-F238E27FC236}">
+                <a16:creationId xmlns:a16="http://schemas.microsoft.com/office/drawing/2014/main" id="{E3B67003-5420-BA0A-25E7-C4609152943A}"/>
+              </a:ext>
+            </a:extLst>
+          </p:cNvPr>
+          <p:cNvPicPr>
+            <a:picLocks noGrp="1" noChangeAspect="1"/>
+          </p:cNvPicPr>
+          <p:nvPr>
+            <p:ph idx="1"/>
+          </p:nvPr>
+        </p:nvPicPr>
+        <p:blipFill>
+          <a:blip r:embed="rId2"/>
+          <a:stretch>
+            <a:fillRect/>
+          </a:stretch>
+        </p:blipFill>
+        <p:spPr>
+          <a:xfrm>
+            <a:off x="2086928" y="1752600"/>
+            <a:ext cx="5760720" cy="4114800"/>
+          </a:xfrm>
+        </p:spPr>
+      </p:pic>
+    </p:spTree>
+    <p:extLst>
+      <p:ext uri="{BB962C8B-B14F-4D97-AF65-F5344CB8AC3E}">
+        <p14:creationId xmlns:p14="http://schemas.microsoft.com/office/powerpoint/2010/main" val="2576134013"/>
+      </p:ext>
+    </p:extLst>
+  </p:cSld>
+  <p:clrMapOvr>
+    <a:masterClrMapping/>
+  </p:clrMapOvr>
+</p:sld>
+</file>
+
+<file path=ppt/slides/slide17.xml><?xml version="1.0" encoding="utf-8"?>
+<p:sld xmlns:a="http://schemas.openxmlformats.org/drawingml/2006/main" xmlns:r="http://schemas.openxmlformats.org/officeDocument/2006/relationships" xmlns:p="http://schemas.openxmlformats.org/presentationml/2006/main">
+  <p:cSld>
+    <p:spTree>
+      <p:nvGrpSpPr>
+        <p:cNvPr id="1" name=""/>
+        <p:cNvGrpSpPr/>
+        <p:nvPr/>
+      </p:nvGrpSpPr>
+      <p:grpSpPr>
+        <a:xfrm>
+          <a:off x="0" y="0"/>
+          <a:ext cx="0" cy="0"/>
+          <a:chOff x="0" y="0"/>
+          <a:chExt cx="0" cy="0"/>
+        </a:xfrm>
+      </p:grpSpPr>
+      <p:sp>
+        <p:nvSpPr>
+          <p:cNvPr id="2" name="Titolo 1">
+            <a:extLst>
+              <a:ext uri="{FF2B5EF4-FFF2-40B4-BE49-F238E27FC236}">
+                <a16:creationId xmlns:a16="http://schemas.microsoft.com/office/drawing/2014/main" id="{D1A8308D-53B7-EAC7-9059-D4934216E56F}"/>
+              </a:ext>
+            </a:extLst>
+          </p:cNvPr>
+          <p:cNvSpPr>
+            <a:spLocks noGrp="1"/>
+          </p:cNvSpPr>
+          <p:nvPr>
+            <p:ph type="title"/>
+          </p:nvPr>
+        </p:nvSpPr>
+        <p:spPr/>
+        <p:txBody>
+          <a:bodyPr/>
+          <a:lstStyle/>
+          <a:p>
+            <a:r>
+              <a:rPr lang="it-IT" dirty="0"/>
+              <a:t>Experiment 1: </a:t>
+            </a:r>
+            <a:r>
+              <a:rPr lang="it-IT" dirty="0" err="1"/>
+              <a:t>CartPole</a:t>
+            </a:r>
+            <a:r>
+              <a:rPr lang="it-IT" dirty="0"/>
+              <a:t> (2) – Evaluation</a:t>
+            </a:r>
+          </a:p>
+        </p:txBody>
+      </p:sp>
+      <p:pic>
+        <p:nvPicPr>
+          <p:cNvPr id="5" name="Segnaposto contenuto 4" descr="Immagine che contiene testo, schermata, diagramma, linea&#10;&#10;Descrizione generata automaticamente">
+            <a:extLst>
+              <a:ext uri="{FF2B5EF4-FFF2-40B4-BE49-F238E27FC236}">
+                <a16:creationId xmlns:a16="http://schemas.microsoft.com/office/drawing/2014/main" id="{6B7AE0FA-395D-965F-5528-7DC70AD744F6}"/>
+              </a:ext>
+            </a:extLst>
+          </p:cNvPr>
+          <p:cNvPicPr>
+            <a:picLocks noGrp="1" noChangeAspect="1"/>
+          </p:cNvPicPr>
+          <p:nvPr>
+            <p:ph idx="1"/>
+          </p:nvPr>
+        </p:nvPicPr>
+        <p:blipFill>
+          <a:blip r:embed="rId2"/>
+          <a:stretch>
+            <a:fillRect/>
+          </a:stretch>
+        </p:blipFill>
+        <p:spPr>
+          <a:xfrm>
+            <a:off x="2086928" y="1752600"/>
+            <a:ext cx="5760720" cy="4114800"/>
+          </a:xfrm>
+        </p:spPr>
+      </p:pic>
+    </p:spTree>
+    <p:extLst>
+      <p:ext uri="{BB962C8B-B14F-4D97-AF65-F5344CB8AC3E}">
+        <p14:creationId xmlns:p14="http://schemas.microsoft.com/office/powerpoint/2010/main" val="368020728"/>
+      </p:ext>
+    </p:extLst>
+  </p:cSld>
+  <p:clrMapOvr>
+    <a:masterClrMapping/>
+  </p:clrMapOvr>
+</p:sld>
+</file>
+
+<file path=ppt/slides/slide18.xml><?xml version="1.0" encoding="utf-8"?>
+<p:sld xmlns:a="http://schemas.openxmlformats.org/drawingml/2006/main" xmlns:r="http://schemas.openxmlformats.org/officeDocument/2006/relationships" xmlns:p="http://schemas.openxmlformats.org/presentationml/2006/main">
+  <p:cSld>
+    <p:spTree>
+      <p:nvGrpSpPr>
+        <p:cNvPr id="1" name=""/>
+        <p:cNvGrpSpPr/>
+        <p:nvPr/>
+      </p:nvGrpSpPr>
+      <p:grpSpPr>
+        <a:xfrm>
+          <a:off x="0" y="0"/>
+          <a:ext cx="0" cy="0"/>
+          <a:chOff x="0" y="0"/>
+          <a:chExt cx="0" cy="0"/>
+        </a:xfrm>
+      </p:grpSpPr>
+      <p:sp>
+        <p:nvSpPr>
+          <p:cNvPr id="2" name="Titolo 1">
+            <a:extLst>
+              <a:ext uri="{FF2B5EF4-FFF2-40B4-BE49-F238E27FC236}">
+                <a16:creationId xmlns:a16="http://schemas.microsoft.com/office/drawing/2014/main" id="{D1A8308D-53B7-EAC7-9059-D4934216E56F}"/>
+              </a:ext>
+            </a:extLst>
+          </p:cNvPr>
+          <p:cNvSpPr>
+            <a:spLocks noGrp="1"/>
+          </p:cNvSpPr>
+          <p:nvPr>
+            <p:ph type="title"/>
+          </p:nvPr>
+        </p:nvSpPr>
+        <p:spPr/>
+        <p:txBody>
+          <a:bodyPr/>
+          <a:lstStyle/>
+          <a:p>
+            <a:r>
+              <a:rPr lang="it-IT" dirty="0"/>
+              <a:t>Experiment 2: </a:t>
+            </a:r>
+            <a:r>
+              <a:rPr lang="it-IT" dirty="0" err="1"/>
+              <a:t>FrozenLake</a:t>
+            </a:r>
+            <a:r>
+              <a:rPr lang="it-IT" dirty="0"/>
+              <a:t> (1) – Training</a:t>
+            </a:r>
+          </a:p>
+        </p:txBody>
+      </p:sp>
+      <p:pic>
+        <p:nvPicPr>
+          <p:cNvPr id="5" name="Segnaposto contenuto 4" descr="Immagine che contiene testo, diagramma, linea, schermata&#10;&#10;Descrizione generata automaticamente">
+            <a:extLst>
+              <a:ext uri="{FF2B5EF4-FFF2-40B4-BE49-F238E27FC236}">
+                <a16:creationId xmlns:a16="http://schemas.microsoft.com/office/drawing/2014/main" id="{EF39AC31-A4A9-1D02-EBE5-F82AE87B8532}"/>
+              </a:ext>
+            </a:extLst>
+          </p:cNvPr>
+          <p:cNvPicPr>
+            <a:picLocks noGrp="1" noChangeAspect="1"/>
+          </p:cNvPicPr>
+          <p:nvPr>
+            <p:ph idx="1"/>
+          </p:nvPr>
+        </p:nvPicPr>
+        <p:blipFill>
+          <a:blip r:embed="rId2"/>
+          <a:stretch>
+            <a:fillRect/>
+          </a:stretch>
+        </p:blipFill>
+        <p:spPr>
+          <a:xfrm>
+            <a:off x="2086928" y="1752600"/>
+            <a:ext cx="5760720" cy="4114800"/>
+          </a:xfrm>
+        </p:spPr>
+      </p:pic>
+    </p:spTree>
+    <p:extLst>
+      <p:ext uri="{BB962C8B-B14F-4D97-AF65-F5344CB8AC3E}">
+        <p14:creationId xmlns:p14="http://schemas.microsoft.com/office/powerpoint/2010/main" val="3068131647"/>
+      </p:ext>
+    </p:extLst>
+  </p:cSld>
+  <p:clrMapOvr>
+    <a:masterClrMapping/>
+  </p:clrMapOvr>
+</p:sld>
+</file>
+
+<file path=ppt/slides/slide19.xml><?xml version="1.0" encoding="utf-8"?>
+<p:sld xmlns:a="http://schemas.openxmlformats.org/drawingml/2006/main" xmlns:r="http://schemas.openxmlformats.org/officeDocument/2006/relationships" xmlns:p="http://schemas.openxmlformats.org/presentationml/2006/main">
+  <p:cSld>
+    <p:spTree>
+      <p:nvGrpSpPr>
+        <p:cNvPr id="1" name=""/>
+        <p:cNvGrpSpPr/>
+        <p:nvPr/>
+      </p:nvGrpSpPr>
+      <p:grpSpPr>
+        <a:xfrm>
+          <a:off x="0" y="0"/>
+          <a:ext cx="0" cy="0"/>
+          <a:chOff x="0" y="0"/>
+          <a:chExt cx="0" cy="0"/>
+        </a:xfrm>
+      </p:grpSpPr>
+      <p:sp>
+        <p:nvSpPr>
+          <p:cNvPr id="2" name="Titolo 1">
+            <a:extLst>
+              <a:ext uri="{FF2B5EF4-FFF2-40B4-BE49-F238E27FC236}">
+                <a16:creationId xmlns:a16="http://schemas.microsoft.com/office/drawing/2014/main" id="{D1A8308D-53B7-EAC7-9059-D4934216E56F}"/>
+              </a:ext>
+            </a:extLst>
+          </p:cNvPr>
+          <p:cNvSpPr>
+            <a:spLocks noGrp="1"/>
+          </p:cNvSpPr>
+          <p:nvPr>
+            <p:ph type="title"/>
+          </p:nvPr>
+        </p:nvSpPr>
+        <p:spPr/>
+        <p:txBody>
+          <a:bodyPr/>
+          <a:lstStyle/>
+          <a:p>
+            <a:r>
+              <a:rPr lang="it-IT" dirty="0"/>
               <a:t>Experiment 2: </a:t>
             </a:r>
             <a:r>
@@ -7935,7 +8284,7 @@
 </p:sld>
 </file>
 
-<file path=ppt/slides/slide17.xml><?xml version="1.0" encoding="utf-8"?>
+<file path=ppt/slides/slide2.xml><?xml version="1.0" encoding="utf-8"?>
 <p:sld xmlns:a="http://schemas.openxmlformats.org/drawingml/2006/main" xmlns:r="http://schemas.openxmlformats.org/officeDocument/2006/relationships" xmlns:p="http://schemas.openxmlformats.org/presentationml/2006/main">
   <p:cSld>
     <p:spTree>
@@ -7977,7 +8326,7 @@
               <a:rPr lang="en-GB" altLang="it-IT" dirty="0">
                 <a:latin typeface="Calibri" panose="020F0502020204030204" pitchFamily="34" charset="0"/>
               </a:rPr>
-              <a:t>Final considerations</a:t>
+              <a:t>Introduction (1)</a:t>
             </a:r>
           </a:p>
         </p:txBody>
@@ -8010,6 +8359,397 @@
               <a:buChar char="Ø"/>
             </a:pPr>
             <a:r>
+              <a:rPr lang="en-GB" altLang="it-IT" sz="2400" b="1" dirty="0">
+                <a:latin typeface="Calibri" panose="020F0502020204030204" pitchFamily="34" charset="0"/>
+              </a:rPr>
+              <a:t>Model-based planning:</a:t>
+            </a:r>
+            <a:endParaRPr lang="en-GB" altLang="it-IT" b="1" dirty="0">
+              <a:latin typeface="Calibri" panose="020F0502020204030204" pitchFamily="34" charset="0"/>
+            </a:endParaRPr>
+          </a:p>
+          <a:p>
+            <a:pPr lvl="1">
+              <a:buFont typeface="Wingdings" panose="05000000000000000000" pitchFamily="2" charset="2"/>
+              <a:buChar char="Ø"/>
+            </a:pPr>
+            <a:r>
+              <a:rPr lang="en-GB" altLang="it-IT" dirty="0">
+                <a:latin typeface="Calibri" panose="020F0502020204030204" pitchFamily="34" charset="0"/>
+              </a:rPr>
+              <a:t>proposal of a sequence of actions</a:t>
+            </a:r>
+          </a:p>
+          <a:p>
+            <a:pPr lvl="1">
+              <a:buFont typeface="Wingdings" panose="05000000000000000000" pitchFamily="2" charset="2"/>
+              <a:buChar char="Ø"/>
+            </a:pPr>
+            <a:r>
+              <a:rPr lang="en-GB" altLang="it-IT" dirty="0">
+                <a:latin typeface="Calibri" panose="020F0502020204030204" pitchFamily="34" charset="0"/>
+              </a:rPr>
+              <a:t>evaluation of such actions with a </a:t>
+            </a:r>
+            <a:r>
+              <a:rPr lang="en-GB" altLang="it-IT" i="1" dirty="0">
+                <a:latin typeface="Calibri" panose="020F0502020204030204" pitchFamily="34" charset="0"/>
+              </a:rPr>
+              <a:t>model</a:t>
+            </a:r>
+            <a:r>
+              <a:rPr lang="en-GB" altLang="it-IT" dirty="0">
+                <a:latin typeface="Calibri" panose="020F0502020204030204" pitchFamily="34" charset="0"/>
+              </a:rPr>
+              <a:t> of the environment </a:t>
+            </a:r>
+          </a:p>
+          <a:p>
+            <a:pPr lvl="1">
+              <a:buFont typeface="Wingdings" panose="05000000000000000000" pitchFamily="2" charset="2"/>
+              <a:buChar char="Ø"/>
+            </a:pPr>
+            <a:r>
+              <a:rPr lang="en-GB" altLang="it-IT" dirty="0">
+                <a:latin typeface="Calibri" panose="020F0502020204030204" pitchFamily="34" charset="0"/>
+              </a:rPr>
+              <a:t>final refinement to optimize expected rewards.</a:t>
+            </a:r>
+          </a:p>
+          <a:p>
+            <a:pPr>
+              <a:buFont typeface="Wingdings" panose="05000000000000000000" pitchFamily="2" charset="2"/>
+              <a:buChar char="Ø"/>
+            </a:pPr>
+            <a:r>
+              <a:rPr lang="en-GB" altLang="it-IT" sz="2400" b="1" dirty="0">
+                <a:latin typeface="Calibri" panose="020F0502020204030204" pitchFamily="34" charset="0"/>
+              </a:rPr>
+              <a:t>Main advantages of model-based vs model-free methods:</a:t>
+            </a:r>
+            <a:endParaRPr lang="en-GB" altLang="it-IT" b="1" dirty="0">
+              <a:latin typeface="Calibri" panose="020F0502020204030204" pitchFamily="34" charset="0"/>
+            </a:endParaRPr>
+          </a:p>
+          <a:p>
+            <a:pPr lvl="1">
+              <a:buFont typeface="Wingdings" panose="05000000000000000000" pitchFamily="2" charset="2"/>
+              <a:buChar char="Ø"/>
+            </a:pPr>
+            <a:r>
+              <a:rPr lang="en-GB" altLang="it-IT" dirty="0">
+                <a:latin typeface="Calibri" panose="020F0502020204030204" pitchFamily="34" charset="0"/>
+              </a:rPr>
+              <a:t>generalization for never encountered states</a:t>
+            </a:r>
+          </a:p>
+          <a:p>
+            <a:pPr lvl="1">
+              <a:buFont typeface="Wingdings" panose="05000000000000000000" pitchFamily="2" charset="2"/>
+              <a:buChar char="Ø"/>
+            </a:pPr>
+            <a:r>
+              <a:rPr lang="en-GB" altLang="it-IT" dirty="0">
+                <a:latin typeface="Calibri" panose="020F0502020204030204" pitchFamily="34" charset="0"/>
+              </a:rPr>
+              <a:t>better linking between present actions and future rewards </a:t>
+            </a:r>
+          </a:p>
+          <a:p>
+            <a:pPr lvl="1">
+              <a:buFont typeface="Wingdings" panose="05000000000000000000" pitchFamily="2" charset="2"/>
+              <a:buChar char="Ø"/>
+            </a:pPr>
+            <a:r>
+              <a:rPr lang="en-GB" altLang="it-IT" dirty="0">
+                <a:latin typeface="Calibri" panose="020F0502020204030204" pitchFamily="34" charset="0"/>
+              </a:rPr>
+              <a:t>resolution of states with the same values or Q values.</a:t>
+            </a:r>
+            <a:endParaRPr lang="en-GB" altLang="it-IT" b="1" dirty="0">
+              <a:latin typeface="Calibri" panose="020F0502020204030204" pitchFamily="34" charset="0"/>
+            </a:endParaRPr>
+          </a:p>
+        </p:txBody>
+      </p:sp>
+    </p:spTree>
+    <p:extLst>
+      <p:ext uri="{BB962C8B-B14F-4D97-AF65-F5344CB8AC3E}">
+        <p14:creationId xmlns:p14="http://schemas.microsoft.com/office/powerpoint/2010/main" val="3037007499"/>
+      </p:ext>
+    </p:extLst>
+  </p:cSld>
+  <p:clrMapOvr>
+    <a:masterClrMapping/>
+  </p:clrMapOvr>
+</p:sld>
+</file>
+
+<file path=ppt/slides/slide20.xml><?xml version="1.0" encoding="utf-8"?>
+<p:sld xmlns:a="http://schemas.openxmlformats.org/drawingml/2006/main" xmlns:r="http://schemas.openxmlformats.org/officeDocument/2006/relationships" xmlns:p="http://schemas.openxmlformats.org/presentationml/2006/main">
+  <p:cSld>
+    <p:spTree>
+      <p:nvGrpSpPr>
+        <p:cNvPr id="1" name=""/>
+        <p:cNvGrpSpPr/>
+        <p:nvPr/>
+      </p:nvGrpSpPr>
+      <p:grpSpPr>
+        <a:xfrm>
+          <a:off x="0" y="0"/>
+          <a:ext cx="0" cy="0"/>
+          <a:chOff x="0" y="0"/>
+          <a:chExt cx="0" cy="0"/>
+        </a:xfrm>
+      </p:grpSpPr>
+      <p:sp>
+        <p:nvSpPr>
+          <p:cNvPr id="2" name="Titolo 1">
+            <a:extLst>
+              <a:ext uri="{FF2B5EF4-FFF2-40B4-BE49-F238E27FC236}">
+                <a16:creationId xmlns:a16="http://schemas.microsoft.com/office/drawing/2014/main" id="{D1A8308D-53B7-EAC7-9059-D4934216E56F}"/>
+              </a:ext>
+            </a:extLst>
+          </p:cNvPr>
+          <p:cNvSpPr>
+            <a:spLocks noGrp="1"/>
+          </p:cNvSpPr>
+          <p:nvPr>
+            <p:ph type="title"/>
+          </p:nvPr>
+        </p:nvSpPr>
+        <p:spPr/>
+        <p:txBody>
+          <a:bodyPr/>
+          <a:lstStyle/>
+          <a:p>
+            <a:r>
+              <a:rPr lang="it-IT" dirty="0"/>
+              <a:t>Experiment 3: </a:t>
+            </a:r>
+            <a:r>
+              <a:rPr lang="it-IT" dirty="0" err="1"/>
+              <a:t>LunarLander</a:t>
+            </a:r>
+            <a:r>
+              <a:rPr lang="it-IT" dirty="0"/>
+              <a:t> (1) – Training</a:t>
+            </a:r>
+          </a:p>
+        </p:txBody>
+      </p:sp>
+      <p:pic>
+        <p:nvPicPr>
+          <p:cNvPr id="6" name="Segnaposto contenuto 5" descr="Immagine che contiene testo, diagramma, linea, schermata&#10;&#10;Descrizione generata automaticamente">
+            <a:extLst>
+              <a:ext uri="{FF2B5EF4-FFF2-40B4-BE49-F238E27FC236}">
+                <a16:creationId xmlns:a16="http://schemas.microsoft.com/office/drawing/2014/main" id="{2294D3D4-0DDD-EE30-C584-D38B63B4D3B8}"/>
+              </a:ext>
+            </a:extLst>
+          </p:cNvPr>
+          <p:cNvPicPr>
+            <a:picLocks noGrp="1" noChangeAspect="1"/>
+          </p:cNvPicPr>
+          <p:nvPr>
+            <p:ph idx="1"/>
+          </p:nvPr>
+        </p:nvPicPr>
+        <p:blipFill>
+          <a:blip r:embed="rId2"/>
+          <a:stretch>
+            <a:fillRect/>
+          </a:stretch>
+        </p:blipFill>
+        <p:spPr>
+          <a:xfrm>
+            <a:off x="2086928" y="1752600"/>
+            <a:ext cx="5760720" cy="4114800"/>
+          </a:xfrm>
+        </p:spPr>
+      </p:pic>
+    </p:spTree>
+    <p:extLst>
+      <p:ext uri="{BB962C8B-B14F-4D97-AF65-F5344CB8AC3E}">
+        <p14:creationId xmlns:p14="http://schemas.microsoft.com/office/powerpoint/2010/main" val="4096476726"/>
+      </p:ext>
+    </p:extLst>
+  </p:cSld>
+  <p:clrMapOvr>
+    <a:masterClrMapping/>
+  </p:clrMapOvr>
+</p:sld>
+</file>
+
+<file path=ppt/slides/slide21.xml><?xml version="1.0" encoding="utf-8"?>
+<p:sld xmlns:a="http://schemas.openxmlformats.org/drawingml/2006/main" xmlns:r="http://schemas.openxmlformats.org/officeDocument/2006/relationships" xmlns:p="http://schemas.openxmlformats.org/presentationml/2006/main">
+  <p:cSld>
+    <p:spTree>
+      <p:nvGrpSpPr>
+        <p:cNvPr id="1" name=""/>
+        <p:cNvGrpSpPr/>
+        <p:nvPr/>
+      </p:nvGrpSpPr>
+      <p:grpSpPr>
+        <a:xfrm>
+          <a:off x="0" y="0"/>
+          <a:ext cx="0" cy="0"/>
+          <a:chOff x="0" y="0"/>
+          <a:chExt cx="0" cy="0"/>
+        </a:xfrm>
+      </p:grpSpPr>
+      <p:sp>
+        <p:nvSpPr>
+          <p:cNvPr id="2" name="Titolo 1">
+            <a:extLst>
+              <a:ext uri="{FF2B5EF4-FFF2-40B4-BE49-F238E27FC236}">
+                <a16:creationId xmlns:a16="http://schemas.microsoft.com/office/drawing/2014/main" id="{D1A8308D-53B7-EAC7-9059-D4934216E56F}"/>
+              </a:ext>
+            </a:extLst>
+          </p:cNvPr>
+          <p:cNvSpPr>
+            <a:spLocks noGrp="1"/>
+          </p:cNvSpPr>
+          <p:nvPr>
+            <p:ph type="title"/>
+          </p:nvPr>
+        </p:nvSpPr>
+        <p:spPr/>
+        <p:txBody>
+          <a:bodyPr/>
+          <a:lstStyle/>
+          <a:p>
+            <a:r>
+              <a:rPr lang="it-IT" dirty="0"/>
+              <a:t>Experiment 2: </a:t>
+            </a:r>
+            <a:r>
+              <a:rPr lang="it-IT" dirty="0" err="1"/>
+              <a:t>LunarLander</a:t>
+            </a:r>
+            <a:r>
+              <a:rPr lang="it-IT" dirty="0"/>
+              <a:t> (2) – Evaluation</a:t>
+            </a:r>
+          </a:p>
+        </p:txBody>
+      </p:sp>
+      <p:pic>
+        <p:nvPicPr>
+          <p:cNvPr id="6" name="Segnaposto contenuto 5" descr="Immagine che contiene testo, diagramma, linea, Diagramma&#10;&#10;Descrizione generata automaticamente">
+            <a:extLst>
+              <a:ext uri="{FF2B5EF4-FFF2-40B4-BE49-F238E27FC236}">
+                <a16:creationId xmlns:a16="http://schemas.microsoft.com/office/drawing/2014/main" id="{53BA10A6-67DE-88E4-33D6-5CABBE72AB6A}"/>
+              </a:ext>
+            </a:extLst>
+          </p:cNvPr>
+          <p:cNvPicPr>
+            <a:picLocks noGrp="1" noChangeAspect="1"/>
+          </p:cNvPicPr>
+          <p:nvPr>
+            <p:ph idx="1"/>
+          </p:nvPr>
+        </p:nvPicPr>
+        <p:blipFill>
+          <a:blip r:embed="rId2"/>
+          <a:stretch>
+            <a:fillRect/>
+          </a:stretch>
+        </p:blipFill>
+        <p:spPr>
+          <a:xfrm>
+            <a:off x="2086928" y="1752600"/>
+            <a:ext cx="5760720" cy="4114800"/>
+          </a:xfrm>
+        </p:spPr>
+      </p:pic>
+    </p:spTree>
+    <p:extLst>
+      <p:ext uri="{BB962C8B-B14F-4D97-AF65-F5344CB8AC3E}">
+        <p14:creationId xmlns:p14="http://schemas.microsoft.com/office/powerpoint/2010/main" val="34608846"/>
+      </p:ext>
+    </p:extLst>
+  </p:cSld>
+  <p:clrMapOvr>
+    <a:masterClrMapping/>
+  </p:clrMapOvr>
+</p:sld>
+</file>
+
+<file path=ppt/slides/slide22.xml><?xml version="1.0" encoding="utf-8"?>
+<p:sld xmlns:a="http://schemas.openxmlformats.org/drawingml/2006/main" xmlns:r="http://schemas.openxmlformats.org/officeDocument/2006/relationships" xmlns:p="http://schemas.openxmlformats.org/presentationml/2006/main">
+  <p:cSld>
+    <p:spTree>
+      <p:nvGrpSpPr>
+        <p:cNvPr id="1" name=""/>
+        <p:cNvGrpSpPr/>
+        <p:nvPr/>
+      </p:nvGrpSpPr>
+      <p:grpSpPr>
+        <a:xfrm>
+          <a:off x="0" y="0"/>
+          <a:ext cx="0" cy="0"/>
+          <a:chOff x="0" y="0"/>
+          <a:chExt cx="0" cy="0"/>
+        </a:xfrm>
+      </p:grpSpPr>
+      <p:sp>
+        <p:nvSpPr>
+          <p:cNvPr id="6146" name="Titolo 1">
+            <a:extLst>
+              <a:ext uri="{FF2B5EF4-FFF2-40B4-BE49-F238E27FC236}">
+                <a16:creationId xmlns:a16="http://schemas.microsoft.com/office/drawing/2014/main" id="{C96A94D4-CE41-7C55-0BA5-D2A9D49E2CB7}"/>
+              </a:ext>
+            </a:extLst>
+          </p:cNvPr>
+          <p:cNvSpPr>
+            <a:spLocks noGrp="1" noChangeArrowheads="1"/>
+          </p:cNvSpPr>
+          <p:nvPr>
+            <p:ph type="title"/>
+          </p:nvPr>
+        </p:nvSpPr>
+        <p:spPr/>
+        <p:txBody>
+          <a:bodyPr/>
+          <a:lstStyle/>
+          <a:p>
+            <a:r>
+              <a:rPr lang="en-GB" altLang="it-IT" dirty="0">
+                <a:latin typeface="Calibri" panose="020F0502020204030204" pitchFamily="34" charset="0"/>
+              </a:rPr>
+              <a:t>Final considerations</a:t>
+            </a:r>
+          </a:p>
+        </p:txBody>
+      </p:sp>
+      <p:sp>
+        <p:nvSpPr>
+          <p:cNvPr id="6147" name="Segnaposto contenuto 2">
+            <a:extLst>
+              <a:ext uri="{FF2B5EF4-FFF2-40B4-BE49-F238E27FC236}">
+                <a16:creationId xmlns:a16="http://schemas.microsoft.com/office/drawing/2014/main" id="{B498F578-6628-CEE1-F814-C7957A5EBB93}"/>
+              </a:ext>
+            </a:extLst>
+          </p:cNvPr>
+          <p:cNvSpPr>
+            <a:spLocks noGrp="1" noChangeArrowheads="1"/>
+          </p:cNvSpPr>
+          <p:nvPr>
+            <p:ph idx="1"/>
+          </p:nvPr>
+        </p:nvSpPr>
+        <p:spPr/>
+        <p:txBody>
+          <a:bodyPr>
+            <a:normAutofit/>
+          </a:bodyPr>
+          <a:lstStyle/>
+          <a:p>
+            <a:pPr>
+              <a:buFont typeface="Wingdings" panose="05000000000000000000" pitchFamily="2" charset="2"/>
+              <a:buChar char="Ø"/>
+            </a:pPr>
+            <a:r>
               <a:rPr lang="en-GB" altLang="it-IT" b="1" dirty="0">
                 <a:latin typeface="Calibri" panose="020F0502020204030204" pitchFamily="34" charset="0"/>
               </a:rPr>
@@ -8034,7 +8774,7 @@
 </p:sld>
 </file>
 
-<file path=ppt/slides/slide18.xml><?xml version="1.0" encoding="utf-8"?>
+<file path=ppt/slides/slide23.xml><?xml version="1.0" encoding="utf-8"?>
 <p:sld xmlns:a="http://schemas.openxmlformats.org/drawingml/2006/main" xmlns:r="http://schemas.openxmlformats.org/officeDocument/2006/relationships" xmlns:p="http://schemas.openxmlformats.org/presentationml/2006/main">
   <p:cSld>
     <p:spTree>
@@ -8728,237 +9468,6 @@
 </p:sld>
 </file>
 
-<file path=ppt/slides/slide19.xml><?xml version="1.0" encoding="utf-8"?>
-<p:sld xmlns:a="http://schemas.openxmlformats.org/drawingml/2006/main" xmlns:r="http://schemas.openxmlformats.org/officeDocument/2006/relationships" xmlns:p="http://schemas.openxmlformats.org/presentationml/2006/main">
-  <p:cSld>
-    <p:spTree>
-      <p:nvGrpSpPr>
-        <p:cNvPr id="1" name=""/>
-        <p:cNvGrpSpPr/>
-        <p:nvPr/>
-      </p:nvGrpSpPr>
-      <p:grpSpPr>
-        <a:xfrm>
-          <a:off x="0" y="0"/>
-          <a:ext cx="0" cy="0"/>
-          <a:chOff x="0" y="0"/>
-          <a:chExt cx="0" cy="0"/>
-        </a:xfrm>
-      </p:grpSpPr>
-    </p:spTree>
-    <p:extLst>
-      <p:ext uri="{BB962C8B-B14F-4D97-AF65-F5344CB8AC3E}">
-        <p14:creationId xmlns:p14="http://schemas.microsoft.com/office/powerpoint/2010/main" val="714567306"/>
-      </p:ext>
-    </p:extLst>
-  </p:cSld>
-  <p:clrMapOvr>
-    <a:masterClrMapping/>
-  </p:clrMapOvr>
-</p:sld>
-</file>
-
-<file path=ppt/slides/slide2.xml><?xml version="1.0" encoding="utf-8"?>
-<p:sld xmlns:a="http://schemas.openxmlformats.org/drawingml/2006/main" xmlns:r="http://schemas.openxmlformats.org/officeDocument/2006/relationships" xmlns:p="http://schemas.openxmlformats.org/presentationml/2006/main">
-  <p:cSld>
-    <p:spTree>
-      <p:nvGrpSpPr>
-        <p:cNvPr id="1" name=""/>
-        <p:cNvGrpSpPr/>
-        <p:nvPr/>
-      </p:nvGrpSpPr>
-      <p:grpSpPr>
-        <a:xfrm>
-          <a:off x="0" y="0"/>
-          <a:ext cx="0" cy="0"/>
-          <a:chOff x="0" y="0"/>
-          <a:chExt cx="0" cy="0"/>
-        </a:xfrm>
-      </p:grpSpPr>
-      <p:sp>
-        <p:nvSpPr>
-          <p:cNvPr id="6146" name="Titolo 1">
-            <a:extLst>
-              <a:ext uri="{FF2B5EF4-FFF2-40B4-BE49-F238E27FC236}">
-                <a16:creationId xmlns:a16="http://schemas.microsoft.com/office/drawing/2014/main" id="{C96A94D4-CE41-7C55-0BA5-D2A9D49E2CB7}"/>
-              </a:ext>
-            </a:extLst>
-          </p:cNvPr>
-          <p:cNvSpPr>
-            <a:spLocks noGrp="1" noChangeArrowheads="1"/>
-          </p:cNvSpPr>
-          <p:nvPr>
-            <p:ph type="title"/>
-          </p:nvPr>
-        </p:nvSpPr>
-        <p:spPr/>
-        <p:txBody>
-          <a:bodyPr/>
-          <a:lstStyle/>
-          <a:p>
-            <a:r>
-              <a:rPr lang="en-GB" altLang="it-IT" dirty="0">
-                <a:latin typeface="Calibri" panose="020F0502020204030204" pitchFamily="34" charset="0"/>
-              </a:rPr>
-              <a:t>Introduction (1)</a:t>
-            </a:r>
-          </a:p>
-        </p:txBody>
-      </p:sp>
-      <p:sp>
-        <p:nvSpPr>
-          <p:cNvPr id="6147" name="Segnaposto contenuto 2">
-            <a:extLst>
-              <a:ext uri="{FF2B5EF4-FFF2-40B4-BE49-F238E27FC236}">
-                <a16:creationId xmlns:a16="http://schemas.microsoft.com/office/drawing/2014/main" id="{B498F578-6628-CEE1-F814-C7957A5EBB93}"/>
-              </a:ext>
-            </a:extLst>
-          </p:cNvPr>
-          <p:cNvSpPr>
-            <a:spLocks noGrp="1" noChangeArrowheads="1"/>
-          </p:cNvSpPr>
-          <p:nvPr>
-            <p:ph idx="1"/>
-          </p:nvPr>
-        </p:nvSpPr>
-        <p:spPr/>
-        <p:txBody>
-          <a:bodyPr>
-            <a:normAutofit/>
-          </a:bodyPr>
-          <a:lstStyle/>
-          <a:p>
-            <a:pPr>
-              <a:buFont typeface="Wingdings" panose="05000000000000000000" pitchFamily="2" charset="2"/>
-              <a:buChar char="Ø"/>
-            </a:pPr>
-            <a:r>
-              <a:rPr lang="en-GB" altLang="it-IT" sz="2400" b="1" dirty="0">
-                <a:latin typeface="Calibri" panose="020F0502020204030204" pitchFamily="34" charset="0"/>
-              </a:rPr>
-              <a:t>Model-based planning:</a:t>
-            </a:r>
-            <a:endParaRPr lang="en-GB" altLang="it-IT" b="1" dirty="0">
-              <a:latin typeface="Calibri" panose="020F0502020204030204" pitchFamily="34" charset="0"/>
-            </a:endParaRPr>
-          </a:p>
-          <a:p>
-            <a:pPr lvl="1">
-              <a:buFont typeface="Wingdings" panose="05000000000000000000" pitchFamily="2" charset="2"/>
-              <a:buChar char="Ø"/>
-            </a:pPr>
-            <a:r>
-              <a:rPr lang="en-GB" altLang="it-IT" dirty="0">
-                <a:latin typeface="Calibri" panose="020F0502020204030204" pitchFamily="34" charset="0"/>
-              </a:rPr>
-              <a:t>proposal of a sequence of actions</a:t>
-            </a:r>
-          </a:p>
-          <a:p>
-            <a:pPr lvl="1">
-              <a:buFont typeface="Wingdings" panose="05000000000000000000" pitchFamily="2" charset="2"/>
-              <a:buChar char="Ø"/>
-            </a:pPr>
-            <a:r>
-              <a:rPr lang="en-GB" altLang="it-IT" dirty="0">
-                <a:latin typeface="Calibri" panose="020F0502020204030204" pitchFamily="34" charset="0"/>
-              </a:rPr>
-              <a:t>evaluation of such actions with a </a:t>
-            </a:r>
-            <a:r>
-              <a:rPr lang="en-GB" altLang="it-IT" i="1" dirty="0">
-                <a:latin typeface="Calibri" panose="020F0502020204030204" pitchFamily="34" charset="0"/>
-              </a:rPr>
-              <a:t>model</a:t>
-            </a:r>
-            <a:r>
-              <a:rPr lang="en-GB" altLang="it-IT" dirty="0">
-                <a:latin typeface="Calibri" panose="020F0502020204030204" pitchFamily="34" charset="0"/>
-              </a:rPr>
-              <a:t> of the environment </a:t>
-            </a:r>
-          </a:p>
-          <a:p>
-            <a:pPr lvl="1">
-              <a:buFont typeface="Wingdings" panose="05000000000000000000" pitchFamily="2" charset="2"/>
-              <a:buChar char="Ø"/>
-            </a:pPr>
-            <a:r>
-              <a:rPr lang="en-GB" altLang="it-IT" dirty="0">
-                <a:latin typeface="Calibri" panose="020F0502020204030204" pitchFamily="34" charset="0"/>
-              </a:rPr>
-              <a:t>final refinement to optimize expected rewards.</a:t>
-            </a:r>
-          </a:p>
-          <a:p>
-            <a:pPr>
-              <a:buFont typeface="Wingdings" panose="05000000000000000000" pitchFamily="2" charset="2"/>
-              <a:buChar char="Ø"/>
-            </a:pPr>
-            <a:r>
-              <a:rPr lang="en-GB" altLang="it-IT" sz="2400" b="1" dirty="0">
-                <a:latin typeface="Calibri" panose="020F0502020204030204" pitchFamily="34" charset="0"/>
-              </a:rPr>
-              <a:t>Main advantages of model-based vs model-free methods:</a:t>
-            </a:r>
-            <a:endParaRPr lang="en-GB" altLang="it-IT" b="1" dirty="0">
-              <a:latin typeface="Calibri" panose="020F0502020204030204" pitchFamily="34" charset="0"/>
-            </a:endParaRPr>
-          </a:p>
-          <a:p>
-            <a:pPr lvl="1">
-              <a:buFont typeface="Wingdings" panose="05000000000000000000" pitchFamily="2" charset="2"/>
-              <a:buChar char="Ø"/>
-            </a:pPr>
-            <a:r>
-              <a:rPr lang="en-GB" altLang="it-IT" dirty="0">
-                <a:latin typeface="Calibri" panose="020F0502020204030204" pitchFamily="34" charset="0"/>
-              </a:rPr>
-              <a:t>generalization for never encountered states</a:t>
-            </a:r>
-          </a:p>
-          <a:p>
-            <a:pPr lvl="1">
-              <a:buFont typeface="Wingdings" panose="05000000000000000000" pitchFamily="2" charset="2"/>
-              <a:buChar char="Ø"/>
-            </a:pPr>
-            <a:r>
-              <a:rPr lang="en-GB" altLang="it-IT" dirty="0">
-                <a:latin typeface="Calibri" panose="020F0502020204030204" pitchFamily="34" charset="0"/>
-              </a:rPr>
-              <a:t>better linking between present actions and future rewards </a:t>
-            </a:r>
-          </a:p>
-          <a:p>
-            <a:pPr lvl="1">
-              <a:buFont typeface="Wingdings" panose="05000000000000000000" pitchFamily="2" charset="2"/>
-              <a:buChar char="Ø"/>
-            </a:pPr>
-            <a:r>
-              <a:rPr lang="en-GB" altLang="it-IT" dirty="0">
-                <a:latin typeface="Calibri" panose="020F0502020204030204" pitchFamily="34" charset="0"/>
-              </a:rPr>
-              <a:t>resolution of states with the same values or Q values.</a:t>
-            </a:r>
-            <a:endParaRPr lang="en-GB" altLang="it-IT" b="1" dirty="0">
-              <a:latin typeface="Calibri" panose="020F0502020204030204" pitchFamily="34" charset="0"/>
-            </a:endParaRPr>
-          </a:p>
-        </p:txBody>
-      </p:sp>
-    </p:spTree>
-    <p:extLst>
-      <p:ext uri="{BB962C8B-B14F-4D97-AF65-F5344CB8AC3E}">
-        <p14:creationId xmlns:p14="http://schemas.microsoft.com/office/powerpoint/2010/main" val="3037007499"/>
-      </p:ext>
-    </p:extLst>
-  </p:cSld>
-  <p:clrMapOvr>
-    <a:masterClrMapping/>
-  </p:clrMapOvr>
-</p:sld>
-</file>
-
 <file path=ppt/slides/slide3.xml><?xml version="1.0" encoding="utf-8"?>
 <p:sld xmlns:a="http://schemas.openxmlformats.org/drawingml/2006/main" xmlns:r="http://schemas.openxmlformats.org/officeDocument/2006/relationships" xmlns:p="http://schemas.openxmlformats.org/presentationml/2006/main">
   <p:cSld>
@@ -9850,31 +10359,37 @@
           </p:sp>
         </mc:Fallback>
       </mc:AlternateContent>
-      <p:sp>
-        <p:nvSpPr>
-          <p:cNvPr id="2" name="Segnaposto contenuto 1">
+      <p:pic>
+        <p:nvPicPr>
+          <p:cNvPr id="3" name="Segnaposto contenuto 2">
             <a:extLst>
               <a:ext uri="{FF2B5EF4-FFF2-40B4-BE49-F238E27FC236}">
-                <a16:creationId xmlns:a16="http://schemas.microsoft.com/office/drawing/2014/main" id="{073607DC-3BB7-2F2E-6C76-773C77001366}"/>
+                <a16:creationId xmlns:a16="http://schemas.microsoft.com/office/drawing/2014/main" id="{4C7DA648-06D4-8B1B-AED2-C3689F1F286A}"/>
               </a:ext>
             </a:extLst>
           </p:cNvPr>
-          <p:cNvSpPr>
-            <a:spLocks noGrp="1"/>
-          </p:cNvSpPr>
+          <p:cNvPicPr>
+            <a:picLocks noGrp="1" noChangeAspect="1"/>
+          </p:cNvPicPr>
           <p:nvPr>
             <p:ph sz="half" idx="2"/>
           </p:nvPr>
-        </p:nvSpPr>
-        <p:spPr/>
-        <p:txBody>
-          <a:bodyPr/>
-          <a:lstStyle/>
-          <a:p>
-            <a:endParaRPr lang="it-IT"/>
-          </a:p>
-        </p:txBody>
-      </p:sp>
+        </p:nvPicPr>
+        <p:blipFill rotWithShape="1">
+          <a:blip r:embed="rId3"/>
+          <a:srcRect l="33463" t="22001" r="32675" b="8001"/>
+          <a:stretch/>
+        </p:blipFill>
+        <p:spPr>
+          <a:xfrm>
+            <a:off x="5054480" y="1752600"/>
+            <a:ext cx="3538777" cy="4114800"/>
+          </a:xfrm>
+          <a:prstGeom prst="rect">
+            <a:avLst/>
+          </a:prstGeom>
+        </p:spPr>
+      </p:pic>
     </p:spTree>
     <p:extLst>
       <p:ext uri="{BB962C8B-B14F-4D97-AF65-F5344CB8AC3E}">
@@ -10297,31 +10812,37 @@
           </p:sp>
         </mc:Fallback>
       </mc:AlternateContent>
-      <p:sp>
-        <p:nvSpPr>
-          <p:cNvPr id="2" name="Segnaposto contenuto 1">
+      <p:pic>
+        <p:nvPicPr>
+          <p:cNvPr id="3" name="Segnaposto contenuto 2">
             <a:extLst>
               <a:ext uri="{FF2B5EF4-FFF2-40B4-BE49-F238E27FC236}">
-                <a16:creationId xmlns:a16="http://schemas.microsoft.com/office/drawing/2014/main" id="{073607DC-3BB7-2F2E-6C76-773C77001366}"/>
+                <a16:creationId xmlns:a16="http://schemas.microsoft.com/office/drawing/2014/main" id="{2306EE5A-E057-A1CA-DBD4-79CAA1004776}"/>
               </a:ext>
             </a:extLst>
           </p:cNvPr>
-          <p:cNvSpPr>
-            <a:spLocks noGrp="1"/>
-          </p:cNvSpPr>
+          <p:cNvPicPr>
+            <a:picLocks noGrp="1" noChangeAspect="1"/>
+          </p:cNvPicPr>
           <p:nvPr>
             <p:ph sz="half" idx="2"/>
           </p:nvPr>
-        </p:nvSpPr>
-        <p:spPr/>
-        <p:txBody>
-          <a:bodyPr/>
-          <a:lstStyle/>
-          <a:p>
-            <a:endParaRPr lang="it-IT"/>
-          </a:p>
-        </p:txBody>
-      </p:sp>
+        </p:nvPicPr>
+        <p:blipFill rotWithShape="1">
+          <a:blip r:embed="rId3"/>
+          <a:srcRect l="33463" t="22000" r="31888" b="10801"/>
+          <a:stretch/>
+        </p:blipFill>
+        <p:spPr>
+          <a:xfrm>
+            <a:off x="4972050" y="1789806"/>
+            <a:ext cx="3703638" cy="4040388"/>
+          </a:xfrm>
+          <a:prstGeom prst="rect">
+            <a:avLst/>
+          </a:prstGeom>
+        </p:spPr>
+      </p:pic>
     </p:spTree>
     <p:extLst>
       <p:ext uri="{BB962C8B-B14F-4D97-AF65-F5344CB8AC3E}">
@@ -11024,31 +11545,37 @@
           </p:sp>
         </mc:Fallback>
       </mc:AlternateContent>
-      <p:sp>
-        <p:nvSpPr>
-          <p:cNvPr id="2" name="Segnaposto contenuto 1">
+      <p:pic>
+        <p:nvPicPr>
+          <p:cNvPr id="3" name="Segnaposto contenuto 2">
             <a:extLst>
               <a:ext uri="{FF2B5EF4-FFF2-40B4-BE49-F238E27FC236}">
-                <a16:creationId xmlns:a16="http://schemas.microsoft.com/office/drawing/2014/main" id="{073607DC-3BB7-2F2E-6C76-773C77001366}"/>
+                <a16:creationId xmlns:a16="http://schemas.microsoft.com/office/drawing/2014/main" id="{131AB70F-5209-A2A1-AE07-7361786DDAF2}"/>
               </a:ext>
             </a:extLst>
           </p:cNvPr>
-          <p:cNvSpPr>
-            <a:spLocks noGrp="1"/>
-          </p:cNvSpPr>
+          <p:cNvPicPr>
+            <a:picLocks noGrp="1" noChangeAspect="1"/>
+          </p:cNvPicPr>
           <p:nvPr>
             <p:ph sz="half" idx="2"/>
           </p:nvPr>
-        </p:nvSpPr>
-        <p:spPr/>
-        <p:txBody>
-          <a:bodyPr/>
-          <a:lstStyle/>
-          <a:p>
-            <a:endParaRPr lang="it-IT"/>
-          </a:p>
-        </p:txBody>
-      </p:sp>
+        </p:nvPicPr>
+        <p:blipFill rotWithShape="1">
+          <a:blip r:embed="rId3"/>
+          <a:srcRect l="33463" t="20602" r="30313" b="3801"/>
+          <a:stretch/>
+        </p:blipFill>
+        <p:spPr>
+          <a:xfrm>
+            <a:off x="5071248" y="1752600"/>
+            <a:ext cx="3505242" cy="4114800"/>
+          </a:xfrm>
+          <a:prstGeom prst="rect">
+            <a:avLst/>
+          </a:prstGeom>
+        </p:spPr>
+      </p:pic>
     </p:spTree>
     <p:extLst>
       <p:ext uri="{BB962C8B-B14F-4D97-AF65-F5344CB8AC3E}">
@@ -11549,31 +12076,37 @@
           </p:sp>
         </mc:Fallback>
       </mc:AlternateContent>
-      <p:sp>
-        <p:nvSpPr>
-          <p:cNvPr id="2" name="Segnaposto contenuto 1">
+      <p:pic>
+        <p:nvPicPr>
+          <p:cNvPr id="3" name="Segnaposto contenuto 2">
             <a:extLst>
               <a:ext uri="{FF2B5EF4-FFF2-40B4-BE49-F238E27FC236}">
-                <a16:creationId xmlns:a16="http://schemas.microsoft.com/office/drawing/2014/main" id="{073607DC-3BB7-2F2E-6C76-773C77001366}"/>
+                <a16:creationId xmlns:a16="http://schemas.microsoft.com/office/drawing/2014/main" id="{A917F50A-B79E-4E74-9974-801DFDF24F88}"/>
               </a:ext>
             </a:extLst>
           </p:cNvPr>
-          <p:cNvSpPr>
-            <a:spLocks noGrp="1"/>
-          </p:cNvSpPr>
+          <p:cNvPicPr>
+            <a:picLocks noGrp="1" noChangeAspect="1"/>
+          </p:cNvPicPr>
           <p:nvPr>
             <p:ph sz="half" idx="2"/>
           </p:nvPr>
-        </p:nvSpPr>
-        <p:spPr/>
-        <p:txBody>
-          <a:bodyPr/>
-          <a:lstStyle/>
-          <a:p>
-            <a:endParaRPr lang="it-IT"/>
-          </a:p>
-        </p:txBody>
-      </p:sp>
+        </p:nvPicPr>
+        <p:blipFill rotWithShape="1">
+          <a:blip r:embed="rId4"/>
+          <a:srcRect l="33463" t="29001" r="24013" b="31800"/>
+          <a:stretch/>
+        </p:blipFill>
+        <p:spPr>
+          <a:xfrm>
+            <a:off x="4972050" y="2849799"/>
+            <a:ext cx="3703638" cy="1920401"/>
+          </a:xfrm>
+          <a:prstGeom prst="rect">
+            <a:avLst/>
+          </a:prstGeom>
+        </p:spPr>
+      </p:pic>
     </p:spTree>
     <p:extLst>
       <p:ext uri="{BB962C8B-B14F-4D97-AF65-F5344CB8AC3E}">
@@ -12130,14 +12663,14 @@
         <a:effectLst/>
         <a:extLst>
           <a:ext uri="{909E8E84-426E-40dd-AFC4-6F175D3DCCD1}">
-            <a14:hiddenFill xmlns:a14="http://schemas.microsoft.com/office/drawing/2010/main" xmlns="">
+            <a14:hiddenFill xmlns="" xmlns:a14="http://schemas.microsoft.com/office/drawing/2010/main">
               <a:solidFill>
                 <a:schemeClr val="accent1"/>
               </a:solidFill>
             </a14:hiddenFill>
           </a:ext>
           <a:ext uri="{91240B29-F687-4f45-9708-019B960494DF}">
-            <a14:hiddenLine xmlns:a14="http://schemas.microsoft.com/office/drawing/2010/main" xmlns="" w="9525" cap="flat" cmpd="sng" algn="ctr">
+            <a14:hiddenLine xmlns="" xmlns:a14="http://schemas.microsoft.com/office/drawing/2010/main" w="9525" cap="flat" cmpd="sng" algn="ctr">
               <a:solidFill>
                 <a:schemeClr val="tx1"/>
               </a:solidFill>
@@ -12148,7 +12681,7 @@
             </a14:hiddenLine>
           </a:ext>
           <a:ext uri="{AF507438-7753-43e0-B8FC-AC1667EBCBE1}">
-            <a14:hiddenEffects xmlns:a14="http://schemas.microsoft.com/office/drawing/2010/main" xmlns="">
+            <a14:hiddenEffects xmlns="" xmlns:a14="http://schemas.microsoft.com/office/drawing/2010/main">
               <a:effectLst>
                 <a:outerShdw blurRad="63500" dist="38099" dir="2700000" algn="ctr" rotWithShape="0">
                   <a:srgbClr val="000000">
@@ -12217,14 +12750,14 @@
         <a:effectLst/>
         <a:extLst>
           <a:ext uri="{909E8E84-426E-40dd-AFC4-6F175D3DCCD1}">
-            <a14:hiddenFill xmlns:a14="http://schemas.microsoft.com/office/drawing/2010/main" xmlns="">
+            <a14:hiddenFill xmlns="" xmlns:a14="http://schemas.microsoft.com/office/drawing/2010/main">
               <a:solidFill>
                 <a:schemeClr val="accent1"/>
               </a:solidFill>
             </a14:hiddenFill>
           </a:ext>
           <a:ext uri="{91240B29-F687-4f45-9708-019B960494DF}">
-            <a14:hiddenLine xmlns:a14="http://schemas.microsoft.com/office/drawing/2010/main" xmlns="" w="9525" cap="flat" cmpd="sng" algn="ctr">
+            <a14:hiddenLine xmlns="" xmlns:a14="http://schemas.microsoft.com/office/drawing/2010/main" w="9525" cap="flat" cmpd="sng" algn="ctr">
               <a:solidFill>
                 <a:schemeClr val="tx1"/>
               </a:solidFill>
@@ -12235,7 +12768,7 @@
             </a14:hiddenLine>
           </a:ext>
           <a:ext uri="{AF507438-7753-43e0-B8FC-AC1667EBCBE1}">
-            <a14:hiddenEffects xmlns:a14="http://schemas.microsoft.com/office/drawing/2010/main" xmlns="">
+            <a14:hiddenEffects xmlns="" xmlns:a14="http://schemas.microsoft.com/office/drawing/2010/main">
               <a:effectLst>
                 <a:outerShdw blurRad="63500" dist="38099" dir="2700000" algn="ctr" rotWithShape="0">
                   <a:srgbClr val="000000">

</xml_diff>

<commit_message>
Updated slides + polishing
</commit_message>
<xml_diff>
--- a/slides/diluccio_giamba_RL_project.pptx
+++ b/slides/diluccio_giamba_RL_project.pptx
@@ -5,10 +5,10 @@
     <p:sldMasterId id="2147483678" r:id="rId1"/>
   </p:sldMasterIdLst>
   <p:notesMasterIdLst>
-    <p:notesMasterId r:id="rId25"/>
+    <p:notesMasterId r:id="rId27"/>
   </p:notesMasterIdLst>
   <p:handoutMasterIdLst>
-    <p:handoutMasterId r:id="rId26"/>
+    <p:handoutMasterId r:id="rId28"/>
   </p:handoutMasterIdLst>
   <p:sldIdLst>
     <p:sldId id="276" r:id="rId2"/>
@@ -33,7 +33,9 @@
     <p:sldId id="314" r:id="rId21"/>
     <p:sldId id="315" r:id="rId22"/>
     <p:sldId id="310" r:id="rId23"/>
-    <p:sldId id="291" r:id="rId24"/>
+    <p:sldId id="317" r:id="rId24"/>
+    <p:sldId id="316" r:id="rId25"/>
+    <p:sldId id="291" r:id="rId26"/>
   </p:sldIdLst>
   <p:sldSz cx="9144000" cy="6858000" type="screen4x3"/>
   <p:notesSz cx="6858000" cy="9144000"/>
@@ -453,7 +455,7 @@
     </p:extLst>
   </p:cSld>
   <p:clrMap bg1="lt1" tx1="dk1" bg2="lt2" tx2="dk2" accent1="accent1" accent2="accent2" accent3="accent3" accent4="accent4" accent5="accent5" accent6="accent6" hlink="hlink" folHlink="folHlink"/>
-  <p:hf hdr="0"/>
+  <p:hf sldNum="0" hdr="0" dt="0"/>
 </p:handoutMaster>
 </file>
 
@@ -1051,7 +1053,7 @@
     </p:spTree>
   </p:cSld>
   <p:clrMap bg1="lt1" tx1="dk1" bg2="lt2" tx2="dk2" accent1="accent1" accent2="accent2" accent3="accent3" accent4="accent4" accent5="accent5" accent6="accent6" hlink="hlink" folHlink="folHlink"/>
-  <p:hf hdr="0"/>
+  <p:hf sldNum="0" hdr="0" dt="0"/>
   <p:notesStyle>
     <a:lvl1pPr algn="l" rtl="0" eaLnBrk="0" fontAlgn="base" hangingPunct="0">
       <a:spcBef>
@@ -1194,173 +1196,6 @@
           <a:chExt cx="0" cy="0"/>
         </a:xfrm>
       </p:grpSpPr>
-      <p:sp>
-        <p:nvSpPr>
-          <p:cNvPr id="5122" name="Rectangle 7">
-            <a:extLst>
-              <a:ext uri="{FF2B5EF4-FFF2-40B4-BE49-F238E27FC236}">
-                <a16:creationId xmlns:a16="http://schemas.microsoft.com/office/drawing/2014/main" id="{37A354A2-9CCE-8F94-0CDF-85B02624B22D}"/>
-              </a:ext>
-            </a:extLst>
-          </p:cNvPr>
-          <p:cNvSpPr>
-            <a:spLocks noGrp="1" noChangeArrowheads="1"/>
-          </p:cNvSpPr>
-          <p:nvPr>
-            <p:ph type="sldNum" sz="quarter" idx="5"/>
-          </p:nvPr>
-        </p:nvSpPr>
-        <p:spPr>
-          <a:noFill/>
-          <a:extLst>
-            <a:ext uri="{909E8E84-426E-40DD-AFC4-6F175D3DCCD1}">
-              <a14:hiddenFill xmlns:a14="http://schemas.microsoft.com/office/drawing/2010/main">
-                <a:solidFill>
-                  <a:schemeClr val="accent1"/>
-                </a:solidFill>
-              </a14:hiddenFill>
-            </a:ext>
-            <a:ext uri="{91240B29-F687-4F45-9708-019B960494DF}">
-              <a14:hiddenLine xmlns:a14="http://schemas.microsoft.com/office/drawing/2010/main" w="9525">
-                <a:solidFill>
-                  <a:schemeClr val="tx1"/>
-                </a:solidFill>
-                <a:miter lim="800000"/>
-                <a:headEnd/>
-                <a:tailEnd/>
-              </a14:hiddenLine>
-            </a:ext>
-          </a:extLst>
-        </p:spPr>
-        <p:txBody>
-          <a:bodyPr/>
-          <a:lstStyle>
-            <a:lvl1pPr>
-              <a:defRPr sz="900">
-                <a:solidFill>
-                  <a:schemeClr val="bg1"/>
-                </a:solidFill>
-                <a:latin typeface="Arial" panose="020B0604020202020204" pitchFamily="34" charset="0"/>
-                <a:ea typeface="MS PGothic" panose="020B0600070205080204" pitchFamily="34" charset="-128"/>
-              </a:defRPr>
-            </a:lvl1pPr>
-            <a:lvl2pPr marL="742950" indent="-285750">
-              <a:defRPr sz="900">
-                <a:solidFill>
-                  <a:schemeClr val="bg1"/>
-                </a:solidFill>
-                <a:latin typeface="Arial" panose="020B0604020202020204" pitchFamily="34" charset="0"/>
-                <a:ea typeface="MS PGothic" panose="020B0600070205080204" pitchFamily="34" charset="-128"/>
-              </a:defRPr>
-            </a:lvl2pPr>
-            <a:lvl3pPr marL="1143000" indent="-228600">
-              <a:defRPr sz="900">
-                <a:solidFill>
-                  <a:schemeClr val="bg1"/>
-                </a:solidFill>
-                <a:latin typeface="Arial" panose="020B0604020202020204" pitchFamily="34" charset="0"/>
-                <a:ea typeface="MS PGothic" panose="020B0600070205080204" pitchFamily="34" charset="-128"/>
-              </a:defRPr>
-            </a:lvl3pPr>
-            <a:lvl4pPr marL="1600200" indent="-228600">
-              <a:defRPr sz="900">
-                <a:solidFill>
-                  <a:schemeClr val="bg1"/>
-                </a:solidFill>
-                <a:latin typeface="Arial" panose="020B0604020202020204" pitchFamily="34" charset="0"/>
-                <a:ea typeface="MS PGothic" panose="020B0600070205080204" pitchFamily="34" charset="-128"/>
-              </a:defRPr>
-            </a:lvl4pPr>
-            <a:lvl5pPr marL="2057400" indent="-228600">
-              <a:defRPr sz="900">
-                <a:solidFill>
-                  <a:schemeClr val="bg1"/>
-                </a:solidFill>
-                <a:latin typeface="Arial" panose="020B0604020202020204" pitchFamily="34" charset="0"/>
-                <a:ea typeface="MS PGothic" panose="020B0600070205080204" pitchFamily="34" charset="-128"/>
-              </a:defRPr>
-            </a:lvl5pPr>
-            <a:lvl6pPr marL="2514600" indent="-228600" eaLnBrk="0" fontAlgn="base" hangingPunct="0">
-              <a:spcBef>
-                <a:spcPct val="0"/>
-              </a:spcBef>
-              <a:spcAft>
-                <a:spcPct val="0"/>
-              </a:spcAft>
-              <a:defRPr sz="900">
-                <a:solidFill>
-                  <a:schemeClr val="bg1"/>
-                </a:solidFill>
-                <a:latin typeface="Arial" panose="020B0604020202020204" pitchFamily="34" charset="0"/>
-                <a:ea typeface="MS PGothic" panose="020B0600070205080204" pitchFamily="34" charset="-128"/>
-              </a:defRPr>
-            </a:lvl6pPr>
-            <a:lvl7pPr marL="2971800" indent="-228600" eaLnBrk="0" fontAlgn="base" hangingPunct="0">
-              <a:spcBef>
-                <a:spcPct val="0"/>
-              </a:spcBef>
-              <a:spcAft>
-                <a:spcPct val="0"/>
-              </a:spcAft>
-              <a:defRPr sz="900">
-                <a:solidFill>
-                  <a:schemeClr val="bg1"/>
-                </a:solidFill>
-                <a:latin typeface="Arial" panose="020B0604020202020204" pitchFamily="34" charset="0"/>
-                <a:ea typeface="MS PGothic" panose="020B0600070205080204" pitchFamily="34" charset="-128"/>
-              </a:defRPr>
-            </a:lvl7pPr>
-            <a:lvl8pPr marL="3429000" indent="-228600" eaLnBrk="0" fontAlgn="base" hangingPunct="0">
-              <a:spcBef>
-                <a:spcPct val="0"/>
-              </a:spcBef>
-              <a:spcAft>
-                <a:spcPct val="0"/>
-              </a:spcAft>
-              <a:defRPr sz="900">
-                <a:solidFill>
-                  <a:schemeClr val="bg1"/>
-                </a:solidFill>
-                <a:latin typeface="Arial" panose="020B0604020202020204" pitchFamily="34" charset="0"/>
-                <a:ea typeface="MS PGothic" panose="020B0600070205080204" pitchFamily="34" charset="-128"/>
-              </a:defRPr>
-            </a:lvl8pPr>
-            <a:lvl9pPr marL="3886200" indent="-228600" eaLnBrk="0" fontAlgn="base" hangingPunct="0">
-              <a:spcBef>
-                <a:spcPct val="0"/>
-              </a:spcBef>
-              <a:spcAft>
-                <a:spcPct val="0"/>
-              </a:spcAft>
-              <a:defRPr sz="900">
-                <a:solidFill>
-                  <a:schemeClr val="bg1"/>
-                </a:solidFill>
-                <a:latin typeface="Arial" panose="020B0604020202020204" pitchFamily="34" charset="0"/>
-                <a:ea typeface="MS PGothic" panose="020B0600070205080204" pitchFamily="34" charset="-128"/>
-              </a:defRPr>
-            </a:lvl9pPr>
-          </a:lstStyle>
-          <a:p>
-            <a:fld id="{6BA6732E-DF7A-4946-9DE1-A68577EC0B97}" type="slidenum">
-              <a:rPr lang="it-IT" altLang="it-IT" sz="1200" smtClean="0">
-                <a:solidFill>
-                  <a:schemeClr val="tx1"/>
-                </a:solidFill>
-                <a:latin typeface="Calibri" panose="020F0502020204030204" pitchFamily="34" charset="0"/>
-              </a:rPr>
-              <a:pPr/>
-              <a:t>1</a:t>
-            </a:fld>
-            <a:endParaRPr lang="it-IT" altLang="it-IT" sz="1200">
-              <a:solidFill>
-                <a:schemeClr val="tx1"/>
-              </a:solidFill>
-              <a:latin typeface="Calibri" panose="020F0502020204030204" pitchFamily="34" charset="0"/>
-            </a:endParaRPr>
-          </a:p>
-        </p:txBody>
-      </p:sp>
       <p:sp>
         <p:nvSpPr>
           <p:cNvPr id="5123" name="Rectangle 2">
@@ -1587,163 +1422,6 @@
           </a:p>
         </p:txBody>
       </p:sp>
-      <p:sp>
-        <p:nvSpPr>
-          <p:cNvPr id="5126" name="Segnaposto data 2">
-            <a:extLst>
-              <a:ext uri="{FF2B5EF4-FFF2-40B4-BE49-F238E27FC236}">
-                <a16:creationId xmlns:a16="http://schemas.microsoft.com/office/drawing/2014/main" id="{31388328-FC50-6996-0929-69FDB8C6DB84}"/>
-              </a:ext>
-            </a:extLst>
-          </p:cNvPr>
-          <p:cNvSpPr>
-            <a:spLocks noGrp="1" noChangeArrowheads="1"/>
-          </p:cNvSpPr>
-          <p:nvPr>
-            <p:ph type="dt" sz="quarter" idx="1"/>
-          </p:nvPr>
-        </p:nvSpPr>
-        <p:spPr>
-          <a:noFill/>
-          <a:extLst>
-            <a:ext uri="{909E8E84-426E-40DD-AFC4-6F175D3DCCD1}">
-              <a14:hiddenFill xmlns:a14="http://schemas.microsoft.com/office/drawing/2010/main">
-                <a:solidFill>
-                  <a:srgbClr val="FFFFFF"/>
-                </a:solidFill>
-              </a14:hiddenFill>
-            </a:ext>
-            <a:ext uri="{91240B29-F687-4F45-9708-019B960494DF}">
-              <a14:hiddenLine xmlns:a14="http://schemas.microsoft.com/office/drawing/2010/main" w="9525">
-                <a:solidFill>
-                  <a:srgbClr val="000000"/>
-                </a:solidFill>
-                <a:miter lim="800000"/>
-                <a:headEnd/>
-                <a:tailEnd/>
-              </a14:hiddenLine>
-            </a:ext>
-          </a:extLst>
-        </p:spPr>
-        <p:txBody>
-          <a:bodyPr/>
-          <a:lstStyle>
-            <a:lvl1pPr>
-              <a:defRPr sz="900">
-                <a:solidFill>
-                  <a:schemeClr val="bg1"/>
-                </a:solidFill>
-                <a:latin typeface="Arial" panose="020B0604020202020204" pitchFamily="34" charset="0"/>
-                <a:ea typeface="MS PGothic" panose="020B0600070205080204" pitchFamily="34" charset="-128"/>
-              </a:defRPr>
-            </a:lvl1pPr>
-            <a:lvl2pPr marL="742950" indent="-285750">
-              <a:defRPr sz="900">
-                <a:solidFill>
-                  <a:schemeClr val="bg1"/>
-                </a:solidFill>
-                <a:latin typeface="Arial" panose="020B0604020202020204" pitchFamily="34" charset="0"/>
-                <a:ea typeface="MS PGothic" panose="020B0600070205080204" pitchFamily="34" charset="-128"/>
-              </a:defRPr>
-            </a:lvl2pPr>
-            <a:lvl3pPr marL="1143000" indent="-228600">
-              <a:defRPr sz="900">
-                <a:solidFill>
-                  <a:schemeClr val="bg1"/>
-                </a:solidFill>
-                <a:latin typeface="Arial" panose="020B0604020202020204" pitchFamily="34" charset="0"/>
-                <a:ea typeface="MS PGothic" panose="020B0600070205080204" pitchFamily="34" charset="-128"/>
-              </a:defRPr>
-            </a:lvl3pPr>
-            <a:lvl4pPr marL="1600200" indent="-228600">
-              <a:defRPr sz="900">
-                <a:solidFill>
-                  <a:schemeClr val="bg1"/>
-                </a:solidFill>
-                <a:latin typeface="Arial" panose="020B0604020202020204" pitchFamily="34" charset="0"/>
-                <a:ea typeface="MS PGothic" panose="020B0600070205080204" pitchFamily="34" charset="-128"/>
-              </a:defRPr>
-            </a:lvl4pPr>
-            <a:lvl5pPr marL="2057400" indent="-228600">
-              <a:defRPr sz="900">
-                <a:solidFill>
-                  <a:schemeClr val="bg1"/>
-                </a:solidFill>
-                <a:latin typeface="Arial" panose="020B0604020202020204" pitchFamily="34" charset="0"/>
-                <a:ea typeface="MS PGothic" panose="020B0600070205080204" pitchFamily="34" charset="-128"/>
-              </a:defRPr>
-            </a:lvl5pPr>
-            <a:lvl6pPr marL="2514600" indent="-228600" eaLnBrk="0" fontAlgn="base" hangingPunct="0">
-              <a:spcBef>
-                <a:spcPct val="0"/>
-              </a:spcBef>
-              <a:spcAft>
-                <a:spcPct val="0"/>
-              </a:spcAft>
-              <a:defRPr sz="900">
-                <a:solidFill>
-                  <a:schemeClr val="bg1"/>
-                </a:solidFill>
-                <a:latin typeface="Arial" panose="020B0604020202020204" pitchFamily="34" charset="0"/>
-                <a:ea typeface="MS PGothic" panose="020B0600070205080204" pitchFamily="34" charset="-128"/>
-              </a:defRPr>
-            </a:lvl6pPr>
-            <a:lvl7pPr marL="2971800" indent="-228600" eaLnBrk="0" fontAlgn="base" hangingPunct="0">
-              <a:spcBef>
-                <a:spcPct val="0"/>
-              </a:spcBef>
-              <a:spcAft>
-                <a:spcPct val="0"/>
-              </a:spcAft>
-              <a:defRPr sz="900">
-                <a:solidFill>
-                  <a:schemeClr val="bg1"/>
-                </a:solidFill>
-                <a:latin typeface="Arial" panose="020B0604020202020204" pitchFamily="34" charset="0"/>
-                <a:ea typeface="MS PGothic" panose="020B0600070205080204" pitchFamily="34" charset="-128"/>
-              </a:defRPr>
-            </a:lvl7pPr>
-            <a:lvl8pPr marL="3429000" indent="-228600" eaLnBrk="0" fontAlgn="base" hangingPunct="0">
-              <a:spcBef>
-                <a:spcPct val="0"/>
-              </a:spcBef>
-              <a:spcAft>
-                <a:spcPct val="0"/>
-              </a:spcAft>
-              <a:defRPr sz="900">
-                <a:solidFill>
-                  <a:schemeClr val="bg1"/>
-                </a:solidFill>
-                <a:latin typeface="Arial" panose="020B0604020202020204" pitchFamily="34" charset="0"/>
-                <a:ea typeface="MS PGothic" panose="020B0600070205080204" pitchFamily="34" charset="-128"/>
-              </a:defRPr>
-            </a:lvl8pPr>
-            <a:lvl9pPr marL="3886200" indent="-228600" eaLnBrk="0" fontAlgn="base" hangingPunct="0">
-              <a:spcBef>
-                <a:spcPct val="0"/>
-              </a:spcBef>
-              <a:spcAft>
-                <a:spcPct val="0"/>
-              </a:spcAft>
-              <a:defRPr sz="900">
-                <a:solidFill>
-                  <a:schemeClr val="bg1"/>
-                </a:solidFill>
-                <a:latin typeface="Arial" panose="020B0604020202020204" pitchFamily="34" charset="0"/>
-                <a:ea typeface="MS PGothic" panose="020B0600070205080204" pitchFamily="34" charset="-128"/>
-              </a:defRPr>
-            </a:lvl9pPr>
-          </a:lstStyle>
-          <a:p>
-            <a:endParaRPr lang="it-IT" altLang="it-IT" sz="1200">
-              <a:solidFill>
-                <a:schemeClr val="tx1"/>
-              </a:solidFill>
-              <a:latin typeface="Calibri" panose="020F0502020204030204" pitchFamily="34" charset="0"/>
-            </a:endParaRPr>
-          </a:p>
-        </p:txBody>
-      </p:sp>
     </p:spTree>
   </p:cSld>
   <p:clrMapOvr>
@@ -1802,28 +1480,6 @@
       </p:sp>
       <p:sp>
         <p:nvSpPr>
-          <p:cNvPr id="4" name="Segnaposto data 3"/>
-          <p:cNvSpPr>
-            <a:spLocks noGrp="1"/>
-          </p:cNvSpPr>
-          <p:nvPr>
-            <p:ph type="dt" idx="1"/>
-          </p:nvPr>
-        </p:nvSpPr>
-        <p:spPr/>
-        <p:txBody>
-          <a:bodyPr/>
-          <a:lstStyle/>
-          <a:p>
-            <a:pPr>
-              <a:defRPr/>
-            </a:pPr>
-            <a:endParaRPr lang="it-IT"/>
-          </a:p>
-        </p:txBody>
-      </p:sp>
-      <p:sp>
-        <p:nvSpPr>
           <p:cNvPr id="5" name="Segnaposto piè di pagina 4"/>
           <p:cNvSpPr>
             <a:spLocks noGrp="1"/>
@@ -1841,35 +1497,6 @@
               <a:defRPr/>
             </a:pPr>
             <a:endParaRPr lang="it-IT"/>
-          </a:p>
-        </p:txBody>
-      </p:sp>
-      <p:sp>
-        <p:nvSpPr>
-          <p:cNvPr id="6" name="Segnaposto numero diapositiva 5"/>
-          <p:cNvSpPr>
-            <a:spLocks noGrp="1"/>
-          </p:cNvSpPr>
-          <p:nvPr>
-            <p:ph type="sldNum" sz="quarter" idx="5"/>
-          </p:nvPr>
-        </p:nvSpPr>
-        <p:spPr/>
-        <p:txBody>
-          <a:bodyPr/>
-          <a:lstStyle/>
-          <a:p>
-            <a:pPr>
-              <a:defRPr/>
-            </a:pPr>
-            <a:fld id="{A3F3855A-90B8-43DC-BD93-48352A3A3511}" type="slidenum">
-              <a:rPr lang="it-IT" altLang="it-IT" smtClean="0"/>
-              <a:pPr>
-                <a:defRPr/>
-              </a:pPr>
-              <a:t>8</a:t>
-            </a:fld>
-            <a:endParaRPr lang="it-IT" altLang="it-IT"/>
           </a:p>
         </p:txBody>
       </p:sp>
@@ -1903,173 +1530,6 @@
           <a:chExt cx="0" cy="0"/>
         </a:xfrm>
       </p:grpSpPr>
-      <p:sp>
-        <p:nvSpPr>
-          <p:cNvPr id="21506" name="Rectangle 7">
-            <a:extLst>
-              <a:ext uri="{FF2B5EF4-FFF2-40B4-BE49-F238E27FC236}">
-                <a16:creationId xmlns:a16="http://schemas.microsoft.com/office/drawing/2014/main" id="{1BC0E4CB-1F10-7184-82A0-3482E10194AC}"/>
-              </a:ext>
-            </a:extLst>
-          </p:cNvPr>
-          <p:cNvSpPr>
-            <a:spLocks noGrp="1" noChangeArrowheads="1"/>
-          </p:cNvSpPr>
-          <p:nvPr>
-            <p:ph type="sldNum" sz="quarter" idx="5"/>
-          </p:nvPr>
-        </p:nvSpPr>
-        <p:spPr>
-          <a:noFill/>
-          <a:extLst>
-            <a:ext uri="{909E8E84-426E-40DD-AFC4-6F175D3DCCD1}">
-              <a14:hiddenFill xmlns:a14="http://schemas.microsoft.com/office/drawing/2010/main">
-                <a:solidFill>
-                  <a:schemeClr val="accent1"/>
-                </a:solidFill>
-              </a14:hiddenFill>
-            </a:ext>
-            <a:ext uri="{91240B29-F687-4F45-9708-019B960494DF}">
-              <a14:hiddenLine xmlns:a14="http://schemas.microsoft.com/office/drawing/2010/main" w="9525">
-                <a:solidFill>
-                  <a:schemeClr val="tx1"/>
-                </a:solidFill>
-                <a:miter lim="800000"/>
-                <a:headEnd/>
-                <a:tailEnd/>
-              </a14:hiddenLine>
-            </a:ext>
-          </a:extLst>
-        </p:spPr>
-        <p:txBody>
-          <a:bodyPr/>
-          <a:lstStyle>
-            <a:lvl1pPr>
-              <a:defRPr sz="900">
-                <a:solidFill>
-                  <a:schemeClr val="bg1"/>
-                </a:solidFill>
-                <a:latin typeface="Arial" panose="020B0604020202020204" pitchFamily="34" charset="0"/>
-                <a:ea typeface="MS PGothic" panose="020B0600070205080204" pitchFamily="34" charset="-128"/>
-              </a:defRPr>
-            </a:lvl1pPr>
-            <a:lvl2pPr marL="742950" indent="-285750">
-              <a:defRPr sz="900">
-                <a:solidFill>
-                  <a:schemeClr val="bg1"/>
-                </a:solidFill>
-                <a:latin typeface="Arial" panose="020B0604020202020204" pitchFamily="34" charset="0"/>
-                <a:ea typeface="MS PGothic" panose="020B0600070205080204" pitchFamily="34" charset="-128"/>
-              </a:defRPr>
-            </a:lvl2pPr>
-            <a:lvl3pPr marL="1143000" indent="-228600">
-              <a:defRPr sz="900">
-                <a:solidFill>
-                  <a:schemeClr val="bg1"/>
-                </a:solidFill>
-                <a:latin typeface="Arial" panose="020B0604020202020204" pitchFamily="34" charset="0"/>
-                <a:ea typeface="MS PGothic" panose="020B0600070205080204" pitchFamily="34" charset="-128"/>
-              </a:defRPr>
-            </a:lvl3pPr>
-            <a:lvl4pPr marL="1600200" indent="-228600">
-              <a:defRPr sz="900">
-                <a:solidFill>
-                  <a:schemeClr val="bg1"/>
-                </a:solidFill>
-                <a:latin typeface="Arial" panose="020B0604020202020204" pitchFamily="34" charset="0"/>
-                <a:ea typeface="MS PGothic" panose="020B0600070205080204" pitchFamily="34" charset="-128"/>
-              </a:defRPr>
-            </a:lvl4pPr>
-            <a:lvl5pPr marL="2057400" indent="-228600">
-              <a:defRPr sz="900">
-                <a:solidFill>
-                  <a:schemeClr val="bg1"/>
-                </a:solidFill>
-                <a:latin typeface="Arial" panose="020B0604020202020204" pitchFamily="34" charset="0"/>
-                <a:ea typeface="MS PGothic" panose="020B0600070205080204" pitchFamily="34" charset="-128"/>
-              </a:defRPr>
-            </a:lvl5pPr>
-            <a:lvl6pPr marL="2514600" indent="-228600" eaLnBrk="0" fontAlgn="base" hangingPunct="0">
-              <a:spcBef>
-                <a:spcPct val="0"/>
-              </a:spcBef>
-              <a:spcAft>
-                <a:spcPct val="0"/>
-              </a:spcAft>
-              <a:defRPr sz="900">
-                <a:solidFill>
-                  <a:schemeClr val="bg1"/>
-                </a:solidFill>
-                <a:latin typeface="Arial" panose="020B0604020202020204" pitchFamily="34" charset="0"/>
-                <a:ea typeface="MS PGothic" panose="020B0600070205080204" pitchFamily="34" charset="-128"/>
-              </a:defRPr>
-            </a:lvl6pPr>
-            <a:lvl7pPr marL="2971800" indent="-228600" eaLnBrk="0" fontAlgn="base" hangingPunct="0">
-              <a:spcBef>
-                <a:spcPct val="0"/>
-              </a:spcBef>
-              <a:spcAft>
-                <a:spcPct val="0"/>
-              </a:spcAft>
-              <a:defRPr sz="900">
-                <a:solidFill>
-                  <a:schemeClr val="bg1"/>
-                </a:solidFill>
-                <a:latin typeface="Arial" panose="020B0604020202020204" pitchFamily="34" charset="0"/>
-                <a:ea typeface="MS PGothic" panose="020B0600070205080204" pitchFamily="34" charset="-128"/>
-              </a:defRPr>
-            </a:lvl7pPr>
-            <a:lvl8pPr marL="3429000" indent="-228600" eaLnBrk="0" fontAlgn="base" hangingPunct="0">
-              <a:spcBef>
-                <a:spcPct val="0"/>
-              </a:spcBef>
-              <a:spcAft>
-                <a:spcPct val="0"/>
-              </a:spcAft>
-              <a:defRPr sz="900">
-                <a:solidFill>
-                  <a:schemeClr val="bg1"/>
-                </a:solidFill>
-                <a:latin typeface="Arial" panose="020B0604020202020204" pitchFamily="34" charset="0"/>
-                <a:ea typeface="MS PGothic" panose="020B0600070205080204" pitchFamily="34" charset="-128"/>
-              </a:defRPr>
-            </a:lvl8pPr>
-            <a:lvl9pPr marL="3886200" indent="-228600" eaLnBrk="0" fontAlgn="base" hangingPunct="0">
-              <a:spcBef>
-                <a:spcPct val="0"/>
-              </a:spcBef>
-              <a:spcAft>
-                <a:spcPct val="0"/>
-              </a:spcAft>
-              <a:defRPr sz="900">
-                <a:solidFill>
-                  <a:schemeClr val="bg1"/>
-                </a:solidFill>
-                <a:latin typeface="Arial" panose="020B0604020202020204" pitchFamily="34" charset="0"/>
-                <a:ea typeface="MS PGothic" panose="020B0600070205080204" pitchFamily="34" charset="-128"/>
-              </a:defRPr>
-            </a:lvl9pPr>
-          </a:lstStyle>
-          <a:p>
-            <a:fld id="{91529030-A2A7-4593-B65C-3F5EB5723014}" type="slidenum">
-              <a:rPr lang="it-IT" altLang="it-IT" sz="1200" smtClean="0">
-                <a:solidFill>
-                  <a:schemeClr val="tx1"/>
-                </a:solidFill>
-                <a:latin typeface="Calibri" panose="020F0502020204030204" pitchFamily="34" charset="0"/>
-              </a:rPr>
-              <a:pPr/>
-              <a:t>23</a:t>
-            </a:fld>
-            <a:endParaRPr lang="it-IT" altLang="it-IT" sz="1200">
-              <a:solidFill>
-                <a:schemeClr val="tx1"/>
-              </a:solidFill>
-              <a:latin typeface="Calibri" panose="020F0502020204030204" pitchFamily="34" charset="0"/>
-            </a:endParaRPr>
-          </a:p>
-        </p:txBody>
-      </p:sp>
       <p:sp>
         <p:nvSpPr>
           <p:cNvPr id="21507" name="Rectangle 2">
@@ -2153,163 +1613,6 @@
           </p:cNvSpPr>
           <p:nvPr>
             <p:ph type="ftr" sz="quarter" idx="4"/>
-          </p:nvPr>
-        </p:nvSpPr>
-        <p:spPr>
-          <a:noFill/>
-          <a:extLst>
-            <a:ext uri="{909E8E84-426E-40DD-AFC4-6F175D3DCCD1}">
-              <a14:hiddenFill xmlns:a14="http://schemas.microsoft.com/office/drawing/2010/main">
-                <a:solidFill>
-                  <a:srgbClr val="FFFFFF"/>
-                </a:solidFill>
-              </a14:hiddenFill>
-            </a:ext>
-            <a:ext uri="{91240B29-F687-4F45-9708-019B960494DF}">
-              <a14:hiddenLine xmlns:a14="http://schemas.microsoft.com/office/drawing/2010/main" w="9525">
-                <a:solidFill>
-                  <a:srgbClr val="000000"/>
-                </a:solidFill>
-                <a:miter lim="800000"/>
-                <a:headEnd/>
-                <a:tailEnd/>
-              </a14:hiddenLine>
-            </a:ext>
-          </a:extLst>
-        </p:spPr>
-        <p:txBody>
-          <a:bodyPr/>
-          <a:lstStyle>
-            <a:lvl1pPr>
-              <a:defRPr sz="900">
-                <a:solidFill>
-                  <a:schemeClr val="bg1"/>
-                </a:solidFill>
-                <a:latin typeface="Arial" panose="020B0604020202020204" pitchFamily="34" charset="0"/>
-                <a:ea typeface="MS PGothic" panose="020B0600070205080204" pitchFamily="34" charset="-128"/>
-              </a:defRPr>
-            </a:lvl1pPr>
-            <a:lvl2pPr marL="742950" indent="-285750">
-              <a:defRPr sz="900">
-                <a:solidFill>
-                  <a:schemeClr val="bg1"/>
-                </a:solidFill>
-                <a:latin typeface="Arial" panose="020B0604020202020204" pitchFamily="34" charset="0"/>
-                <a:ea typeface="MS PGothic" panose="020B0600070205080204" pitchFamily="34" charset="-128"/>
-              </a:defRPr>
-            </a:lvl2pPr>
-            <a:lvl3pPr marL="1143000" indent="-228600">
-              <a:defRPr sz="900">
-                <a:solidFill>
-                  <a:schemeClr val="bg1"/>
-                </a:solidFill>
-                <a:latin typeface="Arial" panose="020B0604020202020204" pitchFamily="34" charset="0"/>
-                <a:ea typeface="MS PGothic" panose="020B0600070205080204" pitchFamily="34" charset="-128"/>
-              </a:defRPr>
-            </a:lvl3pPr>
-            <a:lvl4pPr marL="1600200" indent="-228600">
-              <a:defRPr sz="900">
-                <a:solidFill>
-                  <a:schemeClr val="bg1"/>
-                </a:solidFill>
-                <a:latin typeface="Arial" panose="020B0604020202020204" pitchFamily="34" charset="0"/>
-                <a:ea typeface="MS PGothic" panose="020B0600070205080204" pitchFamily="34" charset="-128"/>
-              </a:defRPr>
-            </a:lvl4pPr>
-            <a:lvl5pPr marL="2057400" indent="-228600">
-              <a:defRPr sz="900">
-                <a:solidFill>
-                  <a:schemeClr val="bg1"/>
-                </a:solidFill>
-                <a:latin typeface="Arial" panose="020B0604020202020204" pitchFamily="34" charset="0"/>
-                <a:ea typeface="MS PGothic" panose="020B0600070205080204" pitchFamily="34" charset="-128"/>
-              </a:defRPr>
-            </a:lvl5pPr>
-            <a:lvl6pPr marL="2514600" indent="-228600" eaLnBrk="0" fontAlgn="base" hangingPunct="0">
-              <a:spcBef>
-                <a:spcPct val="0"/>
-              </a:spcBef>
-              <a:spcAft>
-                <a:spcPct val="0"/>
-              </a:spcAft>
-              <a:defRPr sz="900">
-                <a:solidFill>
-                  <a:schemeClr val="bg1"/>
-                </a:solidFill>
-                <a:latin typeface="Arial" panose="020B0604020202020204" pitchFamily="34" charset="0"/>
-                <a:ea typeface="MS PGothic" panose="020B0600070205080204" pitchFamily="34" charset="-128"/>
-              </a:defRPr>
-            </a:lvl6pPr>
-            <a:lvl7pPr marL="2971800" indent="-228600" eaLnBrk="0" fontAlgn="base" hangingPunct="0">
-              <a:spcBef>
-                <a:spcPct val="0"/>
-              </a:spcBef>
-              <a:spcAft>
-                <a:spcPct val="0"/>
-              </a:spcAft>
-              <a:defRPr sz="900">
-                <a:solidFill>
-                  <a:schemeClr val="bg1"/>
-                </a:solidFill>
-                <a:latin typeface="Arial" panose="020B0604020202020204" pitchFamily="34" charset="0"/>
-                <a:ea typeface="MS PGothic" panose="020B0600070205080204" pitchFamily="34" charset="-128"/>
-              </a:defRPr>
-            </a:lvl7pPr>
-            <a:lvl8pPr marL="3429000" indent="-228600" eaLnBrk="0" fontAlgn="base" hangingPunct="0">
-              <a:spcBef>
-                <a:spcPct val="0"/>
-              </a:spcBef>
-              <a:spcAft>
-                <a:spcPct val="0"/>
-              </a:spcAft>
-              <a:defRPr sz="900">
-                <a:solidFill>
-                  <a:schemeClr val="bg1"/>
-                </a:solidFill>
-                <a:latin typeface="Arial" panose="020B0604020202020204" pitchFamily="34" charset="0"/>
-                <a:ea typeface="MS PGothic" panose="020B0600070205080204" pitchFamily="34" charset="-128"/>
-              </a:defRPr>
-            </a:lvl8pPr>
-            <a:lvl9pPr marL="3886200" indent="-228600" eaLnBrk="0" fontAlgn="base" hangingPunct="0">
-              <a:spcBef>
-                <a:spcPct val="0"/>
-              </a:spcBef>
-              <a:spcAft>
-                <a:spcPct val="0"/>
-              </a:spcAft>
-              <a:defRPr sz="900">
-                <a:solidFill>
-                  <a:schemeClr val="bg1"/>
-                </a:solidFill>
-                <a:latin typeface="Arial" panose="020B0604020202020204" pitchFamily="34" charset="0"/>
-                <a:ea typeface="MS PGothic" panose="020B0600070205080204" pitchFamily="34" charset="-128"/>
-              </a:defRPr>
-            </a:lvl9pPr>
-          </a:lstStyle>
-          <a:p>
-            <a:endParaRPr lang="it-IT" altLang="it-IT" sz="1200">
-              <a:solidFill>
-                <a:schemeClr val="tx1"/>
-              </a:solidFill>
-              <a:latin typeface="Calibri" panose="020F0502020204030204" pitchFamily="34" charset="0"/>
-            </a:endParaRPr>
-          </a:p>
-        </p:txBody>
-      </p:sp>
-      <p:sp>
-        <p:nvSpPr>
-          <p:cNvPr id="21510" name="Segnaposto data 2">
-            <a:extLst>
-              <a:ext uri="{FF2B5EF4-FFF2-40B4-BE49-F238E27FC236}">
-                <a16:creationId xmlns:a16="http://schemas.microsoft.com/office/drawing/2014/main" id="{C5A5A8C3-F930-8729-7882-22C73498B1D8}"/>
-              </a:ext>
-            </a:extLst>
-          </p:cNvPr>
-          <p:cNvSpPr>
-            <a:spLocks noGrp="1" noChangeArrowheads="1"/>
-          </p:cNvSpPr>
-          <p:nvPr>
-            <p:ph type="dt" sz="quarter" idx="1"/>
           </p:nvPr>
         </p:nvSpPr>
         <p:spPr>
@@ -5048,7 +4351,7 @@
     <p:sldLayoutId id="2147483691" r:id="rId13"/>
     <p:sldLayoutId id="2147483692" r:id="rId14"/>
   </p:sldLayoutIdLst>
-  <p:hf hdr="0"/>
+  <p:hf hdr="0" ftr="0" dt="0"/>
   <p:txStyles>
     <p:titleStyle>
       <a:lvl1pPr algn="l" rtl="0" eaLnBrk="0" fontAlgn="base" hangingPunct="0">
@@ -6318,14 +5621,14 @@
           <a:effectLst/>
           <a:extLst>
             <a:ext uri="{909E8E84-426E-40dd-AFC4-6F175D3DCCD1}">
-              <a14:hiddenFill xmlns:a14="http://schemas.microsoft.com/office/drawing/2010/main" xmlns="">
+              <a14:hiddenFill xmlns="" xmlns:a14="http://schemas.microsoft.com/office/drawing/2010/main">
                 <a:solidFill>
                   <a:schemeClr val="accent1"/>
                 </a:solidFill>
               </a14:hiddenFill>
             </a:ext>
             <a:ext uri="{91240B29-F687-4f45-9708-019B960494DF}">
-              <a14:hiddenLine xmlns:a14="http://schemas.microsoft.com/office/drawing/2010/main" xmlns="" w="9525" cap="flat" cmpd="sng" algn="ctr">
+              <a14:hiddenLine xmlns="" xmlns:a14="http://schemas.microsoft.com/office/drawing/2010/main" w="9525" cap="flat" cmpd="sng" algn="ctr">
                 <a:solidFill>
                   <a:schemeClr val="tx1"/>
                 </a:solidFill>
@@ -6336,7 +5639,7 @@
               </a14:hiddenLine>
             </a:ext>
             <a:ext uri="{AF507438-7753-43e0-B8FC-AC1667EBCBE1}">
-              <a14:hiddenEffects xmlns:a14="http://schemas.microsoft.com/office/drawing/2010/main" xmlns="">
+              <a14:hiddenEffects xmlns="" xmlns:a14="http://schemas.microsoft.com/office/drawing/2010/main">
                 <a:effectLst>
                   <a:outerShdw blurRad="63500" dist="38099" dir="2700000" algn="ctr" rotWithShape="0">
                     <a:srgbClr val="000000">
@@ -6414,14 +5717,14 @@
           <a:effectLst/>
           <a:extLst>
             <a:ext uri="{909E8E84-426E-40dd-AFC4-6F175D3DCCD1}">
-              <a14:hiddenFill xmlns:a14="http://schemas.microsoft.com/office/drawing/2010/main" xmlns="">
+              <a14:hiddenFill xmlns="" xmlns:a14="http://schemas.microsoft.com/office/drawing/2010/main">
                 <a:solidFill>
                   <a:schemeClr val="accent1"/>
                 </a:solidFill>
               </a14:hiddenFill>
             </a:ext>
             <a:ext uri="{91240B29-F687-4f45-9708-019B960494DF}">
-              <a14:hiddenLine xmlns:a14="http://schemas.microsoft.com/office/drawing/2010/main" xmlns="" w="9525" cap="flat" cmpd="sng" algn="ctr">
+              <a14:hiddenLine xmlns="" xmlns:a14="http://schemas.microsoft.com/office/drawing/2010/main" w="9525" cap="flat" cmpd="sng" algn="ctr">
                 <a:solidFill>
                   <a:schemeClr val="tx1"/>
                 </a:solidFill>
@@ -6432,7 +5735,7 @@
               </a14:hiddenLine>
             </a:ext>
             <a:ext uri="{AF507438-7753-43e0-B8FC-AC1667EBCBE1}">
-              <a14:hiddenEffects xmlns:a14="http://schemas.microsoft.com/office/drawing/2010/main" xmlns="">
+              <a14:hiddenEffects xmlns="" xmlns:a14="http://schemas.microsoft.com/office/drawing/2010/main">
                 <a:effectLst>
                   <a:outerShdw blurRad="63500" dist="38099" dir="2700000" algn="ctr" rotWithShape="0">
                     <a:srgbClr val="000000">
@@ -7865,19 +7168,7 @@
               <a:rPr lang="en-GB" altLang="it-IT" sz="2400" dirty="0">
                 <a:latin typeface="Calibri" panose="020F0502020204030204" pitchFamily="34" charset="0"/>
               </a:rPr>
-              <a:t> 0, 1 or 2. The models with 1 or 2 are </a:t>
-            </a:r>
-            <a:r>
-              <a:rPr lang="en-GB" altLang="it-IT" sz="2400" i="1" dirty="0">
-                <a:latin typeface="Calibri" panose="020F0502020204030204" pitchFamily="34" charset="0"/>
-              </a:rPr>
-              <a:t>pretrained</a:t>
-            </a:r>
-            <a:r>
-              <a:rPr lang="en-GB" altLang="it-IT" sz="2400" dirty="0">
-                <a:latin typeface="Calibri" panose="020F0502020204030204" pitchFamily="34" charset="0"/>
-              </a:rPr>
-              <a:t> on the model with 0</a:t>
+              <a:t> 0, 1 or 2. The models with 1 or 2 are pretrained on the model with 0</a:t>
             </a:r>
             <a:r>
               <a:rPr lang="en-GB" altLang="it-IT" dirty="0">
@@ -8377,7 +7668,13 @@
               <a:rPr lang="en-GB" altLang="it-IT" dirty="0">
                 <a:latin typeface="Calibri" panose="020F0502020204030204" pitchFamily="34" charset="0"/>
               </a:rPr>
-              <a:t>proposal of a sequence of actions</a:t>
+              <a:t>proposal of a </a:t>
+            </a:r>
+            <a:r>
+              <a:rPr lang="en-GB" altLang="it-IT" b="1" dirty="0">
+                <a:latin typeface="Calibri" panose="020F0502020204030204" pitchFamily="34" charset="0"/>
+              </a:rPr>
+              <a:t>sequence of actions</a:t>
             </a:r>
           </a:p>
           <a:p>
@@ -8392,16 +7689,16 @@
               <a:t>evaluation of such actions with a </a:t>
             </a:r>
             <a:r>
-              <a:rPr lang="en-GB" altLang="it-IT" i="1" dirty="0">
-                <a:latin typeface="Calibri" panose="020F0502020204030204" pitchFamily="34" charset="0"/>
-              </a:rPr>
-              <a:t>model</a:t>
+              <a:rPr lang="en-GB" altLang="it-IT" b="1" dirty="0">
+                <a:latin typeface="Calibri" panose="020F0502020204030204" pitchFamily="34" charset="0"/>
+              </a:rPr>
+              <a:t>model of the environment</a:t>
             </a:r>
             <a:r>
               <a:rPr lang="en-GB" altLang="it-IT" dirty="0">
                 <a:latin typeface="Calibri" panose="020F0502020204030204" pitchFamily="34" charset="0"/>
               </a:rPr>
-              <a:t> of the environment </a:t>
+              <a:t> </a:t>
             </a:r>
           </a:p>
           <a:p>
@@ -8437,10 +7734,16 @@
               <a:buChar char="Ø"/>
             </a:pPr>
             <a:r>
+              <a:rPr lang="en-GB" altLang="it-IT" b="1" dirty="0">
+                <a:latin typeface="Calibri" panose="020F0502020204030204" pitchFamily="34" charset="0"/>
+              </a:rPr>
+              <a:t>generalization</a:t>
+            </a:r>
+            <a:r>
               <a:rPr lang="en-GB" altLang="it-IT" dirty="0">
                 <a:latin typeface="Calibri" panose="020F0502020204030204" pitchFamily="34" charset="0"/>
               </a:rPr>
-              <a:t>generalization for never encountered states</a:t>
+              <a:t> for never encountered states</a:t>
             </a:r>
           </a:p>
           <a:p>
@@ -8461,10 +7764,16 @@
               <a:buChar char="Ø"/>
             </a:pPr>
             <a:r>
+              <a:rPr lang="en-GB" altLang="it-IT" b="1" dirty="0">
+                <a:latin typeface="Calibri" panose="020F0502020204030204" pitchFamily="34" charset="0"/>
+              </a:rPr>
+              <a:t>resolution</a:t>
+            </a:r>
+            <a:r>
               <a:rPr lang="en-GB" altLang="it-IT" dirty="0">
                 <a:latin typeface="Calibri" panose="020F0502020204030204" pitchFamily="34" charset="0"/>
               </a:rPr>
-              <a:t>resolution of states with the same values or Q values.</a:t>
+              <a:t> of states with the same values or Q values.</a:t>
             </a:r>
             <a:endParaRPr lang="en-GB" altLang="it-IT" b="1" dirty="0">
               <a:latin typeface="Calibri" panose="020F0502020204030204" pitchFamily="34" charset="0"/>
@@ -8620,7 +7929,7 @@
           <a:p>
             <a:r>
               <a:rPr lang="it-IT" dirty="0"/>
-              <a:t>Experiment 2: </a:t>
+              <a:t>Experiment 3: </a:t>
             </a:r>
             <a:r>
               <a:rPr lang="it-IT" dirty="0" err="1"/>
@@ -8717,7 +8026,304 @@
               <a:rPr lang="en-GB" altLang="it-IT" dirty="0">
                 <a:latin typeface="Calibri" panose="020F0502020204030204" pitchFamily="34" charset="0"/>
               </a:rPr>
-              <a:t>Final considerations</a:t>
+              <a:t>Final considerations (1)</a:t>
+            </a:r>
+          </a:p>
+        </p:txBody>
+      </p:sp>
+      <mc:AlternateContent xmlns:mc="http://schemas.openxmlformats.org/markup-compatibility/2006" xmlns:a14="http://schemas.microsoft.com/office/drawing/2010/main">
+        <mc:Choice Requires="a14">
+          <p:sp>
+            <p:nvSpPr>
+              <p:cNvPr id="6147" name="Segnaposto contenuto 2">
+                <a:extLst>
+                  <a:ext uri="{FF2B5EF4-FFF2-40B4-BE49-F238E27FC236}">
+                    <a16:creationId xmlns:a16="http://schemas.microsoft.com/office/drawing/2014/main" id="{B498F578-6628-CEE1-F814-C7957A5EBB93}"/>
+                  </a:ext>
+                </a:extLst>
+              </p:cNvPr>
+              <p:cNvSpPr>
+                <a:spLocks noGrp="1" noChangeArrowheads="1"/>
+              </p:cNvSpPr>
+              <p:nvPr>
+                <p:ph idx="1"/>
+              </p:nvPr>
+            </p:nvSpPr>
+            <p:spPr/>
+            <p:txBody>
+              <a:bodyPr>
+                <a:normAutofit/>
+              </a:bodyPr>
+              <a:lstStyle/>
+              <a:p>
+                <a:pPr>
+                  <a:buFont typeface="Wingdings" panose="05000000000000000000" pitchFamily="2" charset="2"/>
+                  <a:buChar char="Ø"/>
+                </a:pPr>
+                <a:r>
+                  <a:rPr lang="en-GB" altLang="it-IT" dirty="0">
+                    <a:latin typeface="Calibri" panose="020F0502020204030204" pitchFamily="34" charset="0"/>
+                  </a:rPr>
+                  <a:t>The paper sounds </a:t>
+                </a:r>
+                <a:r>
+                  <a:rPr lang="en-GB" altLang="it-IT" b="1" dirty="0">
+                    <a:latin typeface="Calibri" panose="020F0502020204030204" pitchFamily="34" charset="0"/>
+                  </a:rPr>
+                  <a:t>vague</a:t>
+                </a:r>
+                <a:r>
+                  <a:rPr lang="en-GB" altLang="it-IT" dirty="0">
+                    <a:latin typeface="Calibri" panose="020F0502020204030204" pitchFamily="34" charset="0"/>
+                  </a:rPr>
+                  <a:t> and </a:t>
+                </a:r>
+                <a:r>
+                  <a:rPr lang="en-GB" altLang="it-IT" b="1" dirty="0">
+                    <a:latin typeface="Calibri" panose="020F0502020204030204" pitchFamily="34" charset="0"/>
+                  </a:rPr>
+                  <a:t>unclear</a:t>
+                </a:r>
+                <a:r>
+                  <a:rPr lang="en-GB" altLang="it-IT" dirty="0">
+                    <a:latin typeface="Calibri" panose="020F0502020204030204" pitchFamily="34" charset="0"/>
+                  </a:rPr>
+                  <a:t> in some parts:</a:t>
+                </a:r>
+              </a:p>
+              <a:p>
+                <a:pPr lvl="1">
+                  <a:buFont typeface="Wingdings" panose="05000000000000000000" pitchFamily="2" charset="2"/>
+                  <a:buChar char="Ø"/>
+                </a:pPr>
+                <a:r>
+                  <a:rPr lang="en-GB" altLang="it-IT" dirty="0">
+                    <a:latin typeface="Calibri" panose="020F0502020204030204" pitchFamily="34" charset="0"/>
+                  </a:rPr>
+                  <a:t>use of an unspecified </a:t>
+                </a:r>
+                <a:r>
+                  <a:rPr lang="en-GB" altLang="it-IT" b="1" dirty="0">
+                    <a:latin typeface="Calibri" panose="020F0502020204030204" pitchFamily="34" charset="0"/>
+                  </a:rPr>
+                  <a:t>target state </a:t>
+                </a:r>
+                <a14:m>
+                  <m:oMath xmlns:m="http://schemas.openxmlformats.org/officeDocument/2006/math">
+                    <m:sSup>
+                      <m:sSupPr>
+                        <m:ctrlPr>
+                          <a:rPr lang="it-IT" altLang="it-IT" b="1" i="1" smtClean="0">
+                            <a:latin typeface="Cambria Math" panose="02040503050406030204" pitchFamily="18" charset="0"/>
+                          </a:rPr>
+                        </m:ctrlPr>
+                      </m:sSupPr>
+                      <m:e>
+                        <m:r>
+                          <a:rPr lang="it-IT" altLang="it-IT" b="1" i="1" smtClean="0">
+                            <a:latin typeface="Cambria Math" panose="02040503050406030204" pitchFamily="18" charset="0"/>
+                          </a:rPr>
+                          <m:t>𝒙</m:t>
+                        </m:r>
+                      </m:e>
+                      <m:sup>
+                        <m:r>
+                          <a:rPr lang="it-IT" altLang="it-IT" b="1" i="1" smtClean="0">
+                            <a:latin typeface="Cambria Math" panose="02040503050406030204" pitchFamily="18" charset="0"/>
+                          </a:rPr>
+                          <m:t>∗</m:t>
+                        </m:r>
+                      </m:sup>
+                    </m:sSup>
+                  </m:oMath>
+                </a14:m>
+                <a:r>
+                  <a:rPr lang="en-GB" altLang="it-IT" dirty="0">
+                    <a:latin typeface="Calibri" panose="020F0502020204030204" pitchFamily="34" charset="0"/>
+                  </a:rPr>
+                  <a:t> in the training algorithm</a:t>
+                </a:r>
+              </a:p>
+              <a:p>
+                <a:pPr lvl="1">
+                  <a:buFont typeface="Wingdings" panose="05000000000000000000" pitchFamily="2" charset="2"/>
+                  <a:buChar char="Ø"/>
+                </a:pPr>
+                <a:r>
+                  <a:rPr lang="en-GB" altLang="it-IT" dirty="0">
+                    <a:latin typeface="Calibri" panose="020F0502020204030204" pitchFamily="34" charset="0"/>
+                  </a:rPr>
+                  <a:t>lack of </a:t>
+                </a:r>
+                <a:r>
+                  <a:rPr lang="en-GB" altLang="it-IT" b="1" dirty="0">
+                    <a:latin typeface="Calibri" panose="020F0502020204030204" pitchFamily="34" charset="0"/>
+                  </a:rPr>
+                  <a:t>detailed instructions on gradients</a:t>
+                </a:r>
+              </a:p>
+              <a:p>
+                <a:pPr lvl="1">
+                  <a:buFont typeface="Wingdings" panose="05000000000000000000" pitchFamily="2" charset="2"/>
+                  <a:buChar char="Ø"/>
+                </a:pPr>
+                <a:r>
+                  <a:rPr lang="en-GB" altLang="it-IT" dirty="0">
+                    <a:latin typeface="Calibri" panose="020F0502020204030204" pitchFamily="34" charset="0"/>
+                  </a:rPr>
+                  <a:t>some </a:t>
+                </a:r>
+                <a:r>
+                  <a:rPr lang="en-GB" altLang="it-IT" b="1" dirty="0">
+                    <a:latin typeface="Calibri" panose="020F0502020204030204" pitchFamily="34" charset="0"/>
+                  </a:rPr>
+                  <a:t>graphs </a:t>
+                </a:r>
+                <a:r>
+                  <a:rPr lang="en-GB" altLang="it-IT" dirty="0">
+                    <a:latin typeface="Calibri" panose="020F0502020204030204" pitchFamily="34" charset="0"/>
+                  </a:rPr>
+                  <a:t>are </a:t>
+                </a:r>
+                <a:r>
+                  <a:rPr lang="en-GB" altLang="it-IT" b="1" dirty="0">
+                    <a:latin typeface="Calibri" panose="020F0502020204030204" pitchFamily="34" charset="0"/>
+                  </a:rPr>
+                  <a:t>difficult to understand</a:t>
+                </a:r>
+              </a:p>
+              <a:p>
+                <a:pPr lvl="1">
+                  <a:buFont typeface="Wingdings" panose="05000000000000000000" pitchFamily="2" charset="2"/>
+                  <a:buChar char="Ø"/>
+                </a:pPr>
+                <a:r>
+                  <a:rPr lang="en-GB" altLang="it-IT" dirty="0">
+                    <a:latin typeface="Calibri" panose="020F0502020204030204" pitchFamily="34" charset="0"/>
+                  </a:rPr>
+                  <a:t>almost no </a:t>
+                </a:r>
+                <a:r>
+                  <a:rPr lang="en-GB" altLang="it-IT" b="1" dirty="0">
+                    <a:latin typeface="Calibri" panose="020F0502020204030204" pitchFamily="34" charset="0"/>
+                  </a:rPr>
+                  <a:t>graphs of results</a:t>
+                </a:r>
+                <a:r>
+                  <a:rPr lang="en-GB" altLang="it-IT" dirty="0">
+                    <a:latin typeface="Calibri" panose="020F0502020204030204" pitchFamily="34" charset="0"/>
+                  </a:rPr>
+                  <a:t> with metrics and statistics</a:t>
+                </a:r>
+              </a:p>
+              <a:p>
+                <a:pPr lvl="1">
+                  <a:buFont typeface="Wingdings" panose="05000000000000000000" pitchFamily="2" charset="2"/>
+                  <a:buChar char="Ø"/>
+                </a:pPr>
+                <a:endParaRPr lang="en-GB" altLang="it-IT" dirty="0">
+                  <a:latin typeface="Calibri" panose="020F0502020204030204" pitchFamily="34" charset="0"/>
+                </a:endParaRPr>
+              </a:p>
+            </p:txBody>
+          </p:sp>
+        </mc:Choice>
+        <mc:Fallback xmlns="">
+          <p:sp>
+            <p:nvSpPr>
+              <p:cNvPr id="6147" name="Segnaposto contenuto 2">
+                <a:extLst>
+                  <a:ext uri="{FF2B5EF4-FFF2-40B4-BE49-F238E27FC236}">
+                    <a16:creationId xmlns:a16="http://schemas.microsoft.com/office/drawing/2014/main" id="{B498F578-6628-CEE1-F814-C7957A5EBB93}"/>
+                  </a:ext>
+                </a:extLst>
+              </p:cNvPr>
+              <p:cNvSpPr>
+                <a:spLocks noGrp="1" noRot="1" noChangeAspect="1" noMove="1" noResize="1" noEditPoints="1" noAdjustHandles="1" noChangeArrowheads="1" noChangeShapeType="1" noTextEdit="1"/>
+              </p:cNvSpPr>
+              <p:nvPr>
+                <p:ph idx="1"/>
+              </p:nvPr>
+            </p:nvSpPr>
+            <p:spPr>
+              <a:blipFill>
+                <a:blip r:embed="rId2"/>
+                <a:stretch>
+                  <a:fillRect l="-1151" t="-1185"/>
+                </a:stretch>
+              </a:blipFill>
+            </p:spPr>
+            <p:txBody>
+              <a:bodyPr/>
+              <a:lstStyle/>
+              <a:p>
+                <a:r>
+                  <a:rPr lang="it-IT">
+                    <a:noFill/>
+                  </a:rPr>
+                  <a:t> </a:t>
+                </a:r>
+              </a:p>
+            </p:txBody>
+          </p:sp>
+        </mc:Fallback>
+      </mc:AlternateContent>
+    </p:spTree>
+    <p:extLst>
+      <p:ext uri="{BB962C8B-B14F-4D97-AF65-F5344CB8AC3E}">
+        <p14:creationId xmlns:p14="http://schemas.microsoft.com/office/powerpoint/2010/main" val="2522966410"/>
+      </p:ext>
+    </p:extLst>
+  </p:cSld>
+  <p:clrMapOvr>
+    <a:masterClrMapping/>
+  </p:clrMapOvr>
+</p:sld>
+</file>
+
+<file path=ppt/slides/slide23.xml><?xml version="1.0" encoding="utf-8"?>
+<p:sld xmlns:a="http://schemas.openxmlformats.org/drawingml/2006/main" xmlns:r="http://schemas.openxmlformats.org/officeDocument/2006/relationships" xmlns:p="http://schemas.openxmlformats.org/presentationml/2006/main">
+  <p:cSld>
+    <p:spTree>
+      <p:nvGrpSpPr>
+        <p:cNvPr id="1" name=""/>
+        <p:cNvGrpSpPr/>
+        <p:nvPr/>
+      </p:nvGrpSpPr>
+      <p:grpSpPr>
+        <a:xfrm>
+          <a:off x="0" y="0"/>
+          <a:ext cx="0" cy="0"/>
+          <a:chOff x="0" y="0"/>
+          <a:chExt cx="0" cy="0"/>
+        </a:xfrm>
+      </p:grpSpPr>
+      <p:sp>
+        <p:nvSpPr>
+          <p:cNvPr id="6146" name="Titolo 1">
+            <a:extLst>
+              <a:ext uri="{FF2B5EF4-FFF2-40B4-BE49-F238E27FC236}">
+                <a16:creationId xmlns:a16="http://schemas.microsoft.com/office/drawing/2014/main" id="{C96A94D4-CE41-7C55-0BA5-D2A9D49E2CB7}"/>
+              </a:ext>
+            </a:extLst>
+          </p:cNvPr>
+          <p:cNvSpPr>
+            <a:spLocks noGrp="1" noChangeArrowheads="1"/>
+          </p:cNvSpPr>
+          <p:nvPr>
+            <p:ph type="title"/>
+          </p:nvPr>
+        </p:nvSpPr>
+        <p:spPr/>
+        <p:txBody>
+          <a:bodyPr/>
+          <a:lstStyle/>
+          <a:p>
+            <a:r>
+              <a:rPr lang="en-GB" altLang="it-IT" dirty="0">
+                <a:latin typeface="Calibri" panose="020F0502020204030204" pitchFamily="34" charset="0"/>
+              </a:rPr>
+              <a:t>Final considerations (2)</a:t>
             </a:r>
           </a:p>
         </p:txBody>
@@ -8745,17 +8351,116 @@
           </a:bodyPr>
           <a:lstStyle/>
           <a:p>
-            <a:pPr>
+            <a:pPr algn="just">
               <a:buFont typeface="Wingdings" panose="05000000000000000000" pitchFamily="2" charset="2"/>
               <a:buChar char="Ø"/>
             </a:pPr>
             <a:r>
+              <a:rPr lang="en-GB" altLang="it-IT" dirty="0">
+                <a:latin typeface="Calibri" panose="020F0502020204030204" pitchFamily="34" charset="0"/>
+              </a:rPr>
+              <a:t>The agent is generally </a:t>
+            </a:r>
+            <a:r>
               <a:rPr lang="en-GB" altLang="it-IT" b="1" dirty="0">
                 <a:latin typeface="Calibri" panose="020F0502020204030204" pitchFamily="34" charset="0"/>
               </a:rPr>
-              <a:t>?</a:t>
-            </a:r>
-            <a:endParaRPr lang="en-GB" altLang="it-IT" sz="2400" b="1" dirty="0">
+              <a:t>unstable </a:t>
+            </a:r>
+            <a:r>
+              <a:rPr lang="en-GB" altLang="it-IT" dirty="0">
+                <a:latin typeface="Calibri" panose="020F0502020204030204" pitchFamily="34" charset="0"/>
+              </a:rPr>
+              <a:t>for various reasons:</a:t>
+            </a:r>
+          </a:p>
+          <a:p>
+            <a:pPr lvl="1">
+              <a:buFont typeface="Wingdings" panose="05000000000000000000" pitchFamily="2" charset="2"/>
+              <a:buChar char="Ø"/>
+            </a:pPr>
+            <a:r>
+              <a:rPr lang="en-GB" altLang="it-IT" dirty="0">
+                <a:latin typeface="Calibri" panose="020F0502020204030204" pitchFamily="34" charset="0"/>
+              </a:rPr>
+              <a:t>use of </a:t>
+            </a:r>
+            <a:r>
+              <a:rPr lang="en-GB" altLang="it-IT" b="1" dirty="0">
+                <a:latin typeface="Calibri" panose="020F0502020204030204" pitchFamily="34" charset="0"/>
+              </a:rPr>
+              <a:t>four different neural networks</a:t>
+            </a:r>
+            <a:endParaRPr lang="en-GB" altLang="it-IT" dirty="0">
+              <a:latin typeface="Calibri" panose="020F0502020204030204" pitchFamily="34" charset="0"/>
+            </a:endParaRPr>
+          </a:p>
+          <a:p>
+            <a:pPr lvl="1">
+              <a:buFont typeface="Wingdings" panose="05000000000000000000" pitchFamily="2" charset="2"/>
+              <a:buChar char="Ø"/>
+            </a:pPr>
+            <a:r>
+              <a:rPr lang="en-GB" altLang="it-IT" dirty="0">
+                <a:latin typeface="Calibri" panose="020F0502020204030204" pitchFamily="34" charset="0"/>
+              </a:rPr>
+              <a:t>the REINFORCE algorithm generates </a:t>
+            </a:r>
+            <a:r>
+              <a:rPr lang="en-GB" altLang="it-IT" b="1" dirty="0">
+                <a:latin typeface="Calibri" panose="020F0502020204030204" pitchFamily="34" charset="0"/>
+              </a:rPr>
+              <a:t>gradients with high variance</a:t>
+            </a:r>
+          </a:p>
+          <a:p>
+            <a:pPr lvl="1">
+              <a:buFont typeface="Wingdings" panose="05000000000000000000" pitchFamily="2" charset="2"/>
+              <a:buChar char="Ø"/>
+            </a:pPr>
+            <a:r>
+              <a:rPr lang="en-GB" altLang="it-IT" dirty="0">
+                <a:latin typeface="Calibri" panose="020F0502020204030204" pitchFamily="34" charset="0"/>
+              </a:rPr>
+              <a:t>training with other RL algorithms could be </a:t>
+            </a:r>
+            <a:r>
+              <a:rPr lang="en-GB" altLang="it-IT" b="1" dirty="0">
+                <a:latin typeface="Calibri" panose="020F0502020204030204" pitchFamily="34" charset="0"/>
+              </a:rPr>
+              <a:t>harder</a:t>
+            </a:r>
+            <a:r>
+              <a:rPr lang="en-GB" altLang="it-IT" dirty="0">
+                <a:latin typeface="Calibri" panose="020F0502020204030204" pitchFamily="34" charset="0"/>
+              </a:rPr>
+              <a:t> and </a:t>
+            </a:r>
+            <a:r>
+              <a:rPr lang="en-GB" altLang="it-IT" b="1" dirty="0">
+                <a:latin typeface="Calibri" panose="020F0502020204030204" pitchFamily="34" charset="0"/>
+              </a:rPr>
+              <a:t>costly</a:t>
+            </a:r>
+            <a:endParaRPr lang="en-GB" altLang="it-IT" dirty="0">
+              <a:latin typeface="Calibri" panose="020F0502020204030204" pitchFamily="34" charset="0"/>
+            </a:endParaRPr>
+          </a:p>
+          <a:p>
+            <a:pPr lvl="1">
+              <a:buFont typeface="Wingdings" panose="05000000000000000000" pitchFamily="2" charset="2"/>
+              <a:buChar char="Ø"/>
+            </a:pPr>
+            <a:endParaRPr lang="en-GB" altLang="it-IT" dirty="0">
+              <a:latin typeface="Calibri" panose="020F0502020204030204" pitchFamily="34" charset="0"/>
+            </a:endParaRPr>
+          </a:p>
+          <a:p>
+            <a:pPr lvl="1">
+              <a:buFont typeface="Wingdings" panose="05000000000000000000" pitchFamily="2" charset="2"/>
+              <a:buChar char="Ø"/>
+            </a:pPr>
+            <a:endParaRPr lang="en-GB" altLang="it-IT" dirty="0">
               <a:latin typeface="Calibri" panose="020F0502020204030204" pitchFamily="34" charset="0"/>
             </a:endParaRPr>
           </a:p>
@@ -8764,7 +8469,7 @@
     </p:spTree>
     <p:extLst>
       <p:ext uri="{BB962C8B-B14F-4D97-AF65-F5344CB8AC3E}">
-        <p14:creationId xmlns:p14="http://schemas.microsoft.com/office/powerpoint/2010/main" val="2522966410"/>
+        <p14:creationId xmlns:p14="http://schemas.microsoft.com/office/powerpoint/2010/main" val="2820441567"/>
       </p:ext>
     </p:extLst>
   </p:cSld>
@@ -8774,7 +8479,316 @@
 </p:sld>
 </file>
 
-<file path=ppt/slides/slide23.xml><?xml version="1.0" encoding="utf-8"?>
+<file path=ppt/slides/slide24.xml><?xml version="1.0" encoding="utf-8"?>
+<p:sld xmlns:a="http://schemas.openxmlformats.org/drawingml/2006/main" xmlns:r="http://schemas.openxmlformats.org/officeDocument/2006/relationships" xmlns:p="http://schemas.openxmlformats.org/presentationml/2006/main">
+  <p:cSld>
+    <p:spTree>
+      <p:nvGrpSpPr>
+        <p:cNvPr id="1" name=""/>
+        <p:cNvGrpSpPr/>
+        <p:nvPr/>
+      </p:nvGrpSpPr>
+      <p:grpSpPr>
+        <a:xfrm>
+          <a:off x="0" y="0"/>
+          <a:ext cx="0" cy="0"/>
+          <a:chOff x="0" y="0"/>
+          <a:chExt cx="0" cy="0"/>
+        </a:xfrm>
+      </p:grpSpPr>
+      <p:sp>
+        <p:nvSpPr>
+          <p:cNvPr id="6146" name="Titolo 1">
+            <a:extLst>
+              <a:ext uri="{FF2B5EF4-FFF2-40B4-BE49-F238E27FC236}">
+                <a16:creationId xmlns:a16="http://schemas.microsoft.com/office/drawing/2014/main" id="{C96A94D4-CE41-7C55-0BA5-D2A9D49E2CB7}"/>
+              </a:ext>
+            </a:extLst>
+          </p:cNvPr>
+          <p:cNvSpPr>
+            <a:spLocks noGrp="1" noChangeArrowheads="1"/>
+          </p:cNvSpPr>
+          <p:nvPr>
+            <p:ph type="title"/>
+          </p:nvPr>
+        </p:nvSpPr>
+        <p:spPr/>
+        <p:txBody>
+          <a:bodyPr/>
+          <a:lstStyle/>
+          <a:p>
+            <a:r>
+              <a:rPr lang="en-GB" altLang="it-IT" dirty="0">
+                <a:latin typeface="Calibri" panose="020F0502020204030204" pitchFamily="34" charset="0"/>
+              </a:rPr>
+              <a:t>Final considerations (3)</a:t>
+            </a:r>
+          </a:p>
+        </p:txBody>
+      </p:sp>
+      <p:sp>
+        <p:nvSpPr>
+          <p:cNvPr id="6147" name="Segnaposto contenuto 2">
+            <a:extLst>
+              <a:ext uri="{FF2B5EF4-FFF2-40B4-BE49-F238E27FC236}">
+                <a16:creationId xmlns:a16="http://schemas.microsoft.com/office/drawing/2014/main" id="{B498F578-6628-CEE1-F814-C7957A5EBB93}"/>
+              </a:ext>
+            </a:extLst>
+          </p:cNvPr>
+          <p:cNvSpPr>
+            <a:spLocks noGrp="1" noChangeArrowheads="1"/>
+          </p:cNvSpPr>
+          <p:nvPr>
+            <p:ph idx="1"/>
+          </p:nvPr>
+        </p:nvSpPr>
+        <p:spPr/>
+        <p:txBody>
+          <a:bodyPr>
+            <a:normAutofit/>
+          </a:bodyPr>
+          <a:lstStyle/>
+          <a:p>
+            <a:pPr>
+              <a:buFont typeface="Wingdings" panose="05000000000000000000" pitchFamily="2" charset="2"/>
+              <a:buChar char="Ø"/>
+            </a:pPr>
+            <a:r>
+              <a:rPr lang="en-GB" altLang="it-IT" dirty="0">
+                <a:latin typeface="Calibri" panose="020F0502020204030204" pitchFamily="34" charset="0"/>
+              </a:rPr>
+              <a:t>The learning algorithm seems </a:t>
+            </a:r>
+            <a:r>
+              <a:rPr lang="en-GB" altLang="it-IT" b="1" dirty="0">
+                <a:latin typeface="Calibri" panose="020F0502020204030204" pitchFamily="34" charset="0"/>
+              </a:rPr>
+              <a:t>tuned</a:t>
+            </a:r>
+            <a:r>
+              <a:rPr lang="en-GB" altLang="it-IT" dirty="0">
+                <a:latin typeface="Calibri" panose="020F0502020204030204" pitchFamily="34" charset="0"/>
+              </a:rPr>
+              <a:t> for something </a:t>
+            </a:r>
+            <a:r>
+              <a:rPr lang="en-GB" altLang="it-IT" b="1" dirty="0">
+                <a:latin typeface="Calibri" panose="020F0502020204030204" pitchFamily="34" charset="0"/>
+              </a:rPr>
+              <a:t>very specific</a:t>
+            </a:r>
+            <a:r>
+              <a:rPr lang="en-GB" altLang="it-IT" dirty="0">
+                <a:latin typeface="Calibri" panose="020F0502020204030204" pitchFamily="34" charset="0"/>
+              </a:rPr>
+              <a:t>:</a:t>
+            </a:r>
+          </a:p>
+          <a:p>
+            <a:pPr lvl="1">
+              <a:buFont typeface="Wingdings" panose="05000000000000000000" pitchFamily="2" charset="2"/>
+              <a:buChar char="Ø"/>
+            </a:pPr>
+            <a:r>
+              <a:rPr lang="it-IT" altLang="it-IT" b="1" dirty="0">
+                <a:latin typeface="Calibri" panose="020F0502020204030204" pitchFamily="34" charset="0"/>
+              </a:rPr>
+              <a:t>good (?) performances</a:t>
+            </a:r>
+            <a:r>
+              <a:rPr lang="it-IT" altLang="it-IT" dirty="0">
+                <a:latin typeface="Calibri" panose="020F0502020204030204" pitchFamily="34" charset="0"/>
+              </a:rPr>
+              <a:t> on </a:t>
+            </a:r>
+            <a:r>
+              <a:rPr lang="it-IT" altLang="it-IT" b="1" dirty="0" err="1">
+                <a:latin typeface="Calibri" panose="020F0502020204030204" pitchFamily="34" charset="0"/>
+              </a:rPr>
+              <a:t>environment</a:t>
+            </a:r>
+            <a:r>
+              <a:rPr lang="it-IT" altLang="it-IT" b="1" dirty="0">
+                <a:latin typeface="Calibri" panose="020F0502020204030204" pitchFamily="34" charset="0"/>
+              </a:rPr>
+              <a:t> </a:t>
+            </a:r>
+            <a:r>
+              <a:rPr lang="it-IT" altLang="it-IT" b="1" dirty="0" err="1">
+                <a:latin typeface="Calibri" panose="020F0502020204030204" pitchFamily="34" charset="0"/>
+              </a:rPr>
+              <a:t>created</a:t>
+            </a:r>
+            <a:r>
+              <a:rPr lang="it-IT" altLang="it-IT" b="1" dirty="0">
+                <a:latin typeface="Calibri" panose="020F0502020204030204" pitchFamily="34" charset="0"/>
+              </a:rPr>
+              <a:t> ad-hoc</a:t>
+            </a:r>
+            <a:r>
+              <a:rPr lang="it-IT" altLang="it-IT" dirty="0">
+                <a:latin typeface="Calibri" panose="020F0502020204030204" pitchFamily="34" charset="0"/>
+              </a:rPr>
+              <a:t> (</a:t>
+            </a:r>
+            <a:r>
+              <a:rPr lang="it-IT" altLang="it-IT" dirty="0" err="1">
+                <a:latin typeface="Calibri" panose="020F0502020204030204" pitchFamily="34" charset="0"/>
+              </a:rPr>
+              <a:t>spaceship</a:t>
+            </a:r>
+            <a:r>
+              <a:rPr lang="it-IT" altLang="it-IT" dirty="0">
+                <a:latin typeface="Calibri" panose="020F0502020204030204" pitchFamily="34" charset="0"/>
+              </a:rPr>
+              <a:t> task)</a:t>
+            </a:r>
+            <a:endParaRPr lang="en-GB" altLang="it-IT" dirty="0">
+              <a:latin typeface="Calibri" panose="020F0502020204030204" pitchFamily="34" charset="0"/>
+            </a:endParaRPr>
+          </a:p>
+          <a:p>
+            <a:pPr lvl="1">
+              <a:buFont typeface="Wingdings" panose="05000000000000000000" pitchFamily="2" charset="2"/>
+              <a:buChar char="Ø"/>
+            </a:pPr>
+            <a:r>
+              <a:rPr lang="en-GB" altLang="it-IT" b="1" dirty="0">
+                <a:latin typeface="Calibri" panose="020F0502020204030204" pitchFamily="34" charset="0"/>
+              </a:rPr>
+              <a:t>poor performances</a:t>
+            </a:r>
+            <a:r>
+              <a:rPr lang="en-GB" altLang="it-IT" dirty="0">
+                <a:latin typeface="Calibri" panose="020F0502020204030204" pitchFamily="34" charset="0"/>
+              </a:rPr>
+              <a:t> on </a:t>
+            </a:r>
+            <a:r>
+              <a:rPr lang="en-GB" altLang="it-IT" b="1" dirty="0">
+                <a:latin typeface="Calibri" panose="020F0502020204030204" pitchFamily="34" charset="0"/>
+              </a:rPr>
+              <a:t>simpler ones</a:t>
+            </a:r>
+          </a:p>
+          <a:p>
+            <a:pPr lvl="1">
+              <a:buFont typeface="Wingdings" panose="05000000000000000000" pitchFamily="2" charset="2"/>
+              <a:buChar char="Ø"/>
+            </a:pPr>
+            <a:r>
+              <a:rPr lang="en-GB" altLang="it-IT" dirty="0">
+                <a:latin typeface="Calibri" panose="020F0502020204030204" pitchFamily="34" charset="0"/>
+              </a:rPr>
+              <a:t>it may not </a:t>
+            </a:r>
+            <a:r>
+              <a:rPr lang="en-GB" altLang="it-IT" b="1" dirty="0">
+                <a:latin typeface="Calibri" panose="020F0502020204030204" pitchFamily="34" charset="0"/>
+              </a:rPr>
+              <a:t>fail </a:t>
+            </a:r>
+            <a:r>
+              <a:rPr lang="en-GB" altLang="it-IT" dirty="0">
+                <a:latin typeface="Calibri" panose="020F0502020204030204" pitchFamily="34" charset="0"/>
+              </a:rPr>
+              <a:t>on </a:t>
+            </a:r>
+            <a:r>
+              <a:rPr lang="en-GB" altLang="it-IT" b="1" dirty="0">
+                <a:latin typeface="Calibri" panose="020F0502020204030204" pitchFamily="34" charset="0"/>
+              </a:rPr>
+              <a:t>generalization</a:t>
+            </a:r>
+            <a:r>
+              <a:rPr lang="en-GB" altLang="it-IT" dirty="0">
+                <a:latin typeface="Calibri" panose="020F0502020204030204" pitchFamily="34" charset="0"/>
+              </a:rPr>
+              <a:t> if the components are implemented with </a:t>
+            </a:r>
+            <a:r>
+              <a:rPr lang="en-GB" altLang="it-IT" b="1" dirty="0">
+                <a:latin typeface="Calibri" panose="020F0502020204030204" pitchFamily="34" charset="0"/>
+              </a:rPr>
+              <a:t>more powerful and complex neural networks</a:t>
+            </a:r>
+            <a:r>
+              <a:rPr lang="en-GB" altLang="it-IT" dirty="0">
+                <a:latin typeface="Calibri" panose="020F0502020204030204" pitchFamily="34" charset="0"/>
+              </a:rPr>
+              <a:t> (</a:t>
+            </a:r>
+            <a:r>
+              <a:rPr lang="en-GB" altLang="it-IT" b="1" dirty="0">
+                <a:latin typeface="Calibri" panose="020F0502020204030204" pitchFamily="34" charset="0"/>
+              </a:rPr>
+              <a:t>GNNs</a:t>
+            </a:r>
+            <a:r>
+              <a:rPr lang="en-GB" altLang="it-IT" dirty="0">
+                <a:latin typeface="Calibri" panose="020F0502020204030204" pitchFamily="34" charset="0"/>
+              </a:rPr>
+              <a:t>)</a:t>
+            </a:r>
+            <a:endParaRPr lang="en-GB" altLang="it-IT" b="1" dirty="0">
+              <a:latin typeface="Calibri" panose="020F0502020204030204" pitchFamily="34" charset="0"/>
+            </a:endParaRPr>
+          </a:p>
+          <a:p>
+            <a:pPr lvl="1">
+              <a:buFont typeface="Wingdings" panose="05000000000000000000" pitchFamily="2" charset="2"/>
+              <a:buChar char="Ø"/>
+            </a:pPr>
+            <a:r>
+              <a:rPr lang="en-GB" altLang="it-IT" b="1" dirty="0">
+                <a:latin typeface="Calibri" panose="020F0502020204030204" pitchFamily="34" charset="0"/>
+              </a:rPr>
+              <a:t>advanced neural networks</a:t>
+            </a:r>
+            <a:r>
+              <a:rPr lang="en-GB" altLang="it-IT" dirty="0">
+                <a:latin typeface="Calibri" panose="020F0502020204030204" pitchFamily="34" charset="0"/>
+              </a:rPr>
+              <a:t> could </a:t>
+            </a:r>
+            <a:r>
+              <a:rPr lang="en-GB" altLang="it-IT" b="1" dirty="0">
+                <a:latin typeface="Calibri" panose="020F0502020204030204" pitchFamily="34" charset="0"/>
+              </a:rPr>
+              <a:t>slow down </a:t>
+            </a:r>
+            <a:r>
+              <a:rPr lang="en-GB" altLang="it-IT" dirty="0">
+                <a:latin typeface="Calibri" panose="020F0502020204030204" pitchFamily="34" charset="0"/>
+              </a:rPr>
+              <a:t>the agent</a:t>
+            </a:r>
+          </a:p>
+          <a:p>
+            <a:pPr lvl="1">
+              <a:buFont typeface="Wingdings" panose="05000000000000000000" pitchFamily="2" charset="2"/>
+              <a:buChar char="Ø"/>
+            </a:pPr>
+            <a:endParaRPr lang="en-GB" altLang="it-IT" dirty="0">
+              <a:latin typeface="Calibri" panose="020F0502020204030204" pitchFamily="34" charset="0"/>
+            </a:endParaRPr>
+          </a:p>
+        </p:txBody>
+      </p:sp>
+    </p:spTree>
+    <p:extLst>
+      <p:ext uri="{BB962C8B-B14F-4D97-AF65-F5344CB8AC3E}">
+        <p14:creationId xmlns:p14="http://schemas.microsoft.com/office/powerpoint/2010/main" val="864405880"/>
+      </p:ext>
+    </p:extLst>
+  </p:cSld>
+  <p:clrMapOvr>
+    <a:masterClrMapping/>
+  </p:clrMapOvr>
+</p:sld>
+</file>
+
+<file path=ppt/slides/slide25.xml><?xml version="1.0" encoding="utf-8"?>
 <p:sld xmlns:a="http://schemas.openxmlformats.org/drawingml/2006/main" xmlns:r="http://schemas.openxmlformats.org/officeDocument/2006/relationships" xmlns:p="http://schemas.openxmlformats.org/presentationml/2006/main">
   <p:cSld>
     <p:spTree>
@@ -9555,7 +9569,7 @@
               <a:t>: a model can </a:t>
             </a:r>
             <a:r>
-              <a:rPr lang="en-GB" altLang="it-IT" i="1" dirty="0">
+              <a:rPr lang="en-GB" altLang="it-IT" b="1" dirty="0">
                 <a:latin typeface="Calibri" panose="020F0502020204030204" pitchFamily="34" charset="0"/>
               </a:rPr>
               <a:t>evaluate</a:t>
@@ -9567,7 +9581,7 @@
               <a:t> a plan and </a:t>
             </a:r>
             <a:r>
-              <a:rPr lang="en-GB" altLang="it-IT" i="1" dirty="0">
+              <a:rPr lang="en-GB" altLang="it-IT" b="1" dirty="0">
                 <a:latin typeface="Calibri" panose="020F0502020204030204" pitchFamily="34" charset="0"/>
               </a:rPr>
               <a:t>execute</a:t>
@@ -9579,7 +9593,7 @@
               <a:t> it, but it doesn’t know how to </a:t>
             </a:r>
             <a:r>
-              <a:rPr lang="en-GB" altLang="it-IT" i="1" dirty="0">
+              <a:rPr lang="en-GB" altLang="it-IT" b="1" dirty="0">
                 <a:latin typeface="Calibri" panose="020F0502020204030204" pitchFamily="34" charset="0"/>
               </a:rPr>
               <a:t>construct</a:t>
@@ -9742,7 +9756,7 @@
               <a:t>The whole IBP can be seen as a </a:t>
             </a:r>
             <a:r>
-              <a:rPr lang="en-GB" altLang="it-IT" sz="1600" i="1" dirty="0">
+              <a:rPr lang="en-GB" altLang="it-IT" sz="1600" b="1" dirty="0">
                 <a:latin typeface="Calibri" panose="020F0502020204030204" pitchFamily="34" charset="0"/>
               </a:rPr>
               <a:t>recurrent policy</a:t>
@@ -12221,7 +12235,7 @@
               <a:t> to </a:t>
             </a:r>
             <a:r>
-              <a:rPr lang="en-GB" altLang="it-IT" sz="1600" i="1" dirty="0">
+              <a:rPr lang="en-GB" altLang="it-IT" sz="1600" b="1" dirty="0">
                 <a:latin typeface="Calibri" panose="020F0502020204030204" pitchFamily="34" charset="0"/>
               </a:rPr>
               <a:t>construct</a:t>
@@ -12302,13 +12316,31 @@
               <a:rPr lang="en-GB" altLang="it-IT" sz="1600" dirty="0">
                 <a:latin typeface="Calibri" panose="020F0502020204030204" pitchFamily="34" charset="0"/>
               </a:rPr>
-              <a:t>: simpler version of the </a:t>
+              <a:t>: </a:t>
+            </a:r>
+            <a:r>
+              <a:rPr lang="en-GB" altLang="it-IT" sz="1600" b="1" dirty="0">
+                <a:latin typeface="Calibri" panose="020F0502020204030204" pitchFamily="34" charset="0"/>
+              </a:rPr>
+              <a:t>simpler</a:t>
+            </a:r>
+            <a:r>
+              <a:rPr lang="en-GB" altLang="it-IT" sz="1600" dirty="0">
+                <a:latin typeface="Calibri" panose="020F0502020204030204" pitchFamily="34" charset="0"/>
+              </a:rPr>
+              <a:t> version of the </a:t>
+            </a:r>
+            <a:r>
+              <a:rPr lang="en-GB" altLang="it-IT" sz="1600" b="1" dirty="0">
+                <a:latin typeface="Calibri" panose="020F0502020204030204" pitchFamily="34" charset="0"/>
+              </a:rPr>
+              <a:t>imagination tree</a:t>
             </a:r>
             <a:r>
               <a:rPr lang="en-GB" altLang="it-IT" sz="1600" i="1" dirty="0">
                 <a:latin typeface="Calibri" panose="020F0502020204030204" pitchFamily="34" charset="0"/>
               </a:rPr>
-              <a:t>imagination tree.</a:t>
+              <a:t>.</a:t>
             </a:r>
             <a:endParaRPr lang="en-GB" altLang="it-IT" sz="1600" b="1" dirty="0">
               <a:latin typeface="Calibri" panose="020F0502020204030204" pitchFamily="34" charset="0"/>
@@ -12663,14 +12695,14 @@
         <a:effectLst/>
         <a:extLst>
           <a:ext uri="{909E8E84-426E-40dd-AFC4-6F175D3DCCD1}">
-            <a14:hiddenFill xmlns="" xmlns:a14="http://schemas.microsoft.com/office/drawing/2010/main">
+            <a14:hiddenFill xmlns:a14="http://schemas.microsoft.com/office/drawing/2010/main" xmlns="">
               <a:solidFill>
                 <a:schemeClr val="accent1"/>
               </a:solidFill>
             </a14:hiddenFill>
           </a:ext>
           <a:ext uri="{91240B29-F687-4f45-9708-019B960494DF}">
-            <a14:hiddenLine xmlns="" xmlns:a14="http://schemas.microsoft.com/office/drawing/2010/main" w="9525" cap="flat" cmpd="sng" algn="ctr">
+            <a14:hiddenLine xmlns:a14="http://schemas.microsoft.com/office/drawing/2010/main" xmlns="" w="9525" cap="flat" cmpd="sng" algn="ctr">
               <a:solidFill>
                 <a:schemeClr val="tx1"/>
               </a:solidFill>
@@ -12681,7 +12713,7 @@
             </a14:hiddenLine>
           </a:ext>
           <a:ext uri="{AF507438-7753-43e0-B8FC-AC1667EBCBE1}">
-            <a14:hiddenEffects xmlns="" xmlns:a14="http://schemas.microsoft.com/office/drawing/2010/main">
+            <a14:hiddenEffects xmlns:a14="http://schemas.microsoft.com/office/drawing/2010/main" xmlns="">
               <a:effectLst>
                 <a:outerShdw blurRad="63500" dist="38099" dir="2700000" algn="ctr" rotWithShape="0">
                   <a:srgbClr val="000000">
@@ -12750,14 +12782,14 @@
         <a:effectLst/>
         <a:extLst>
           <a:ext uri="{909E8E84-426E-40dd-AFC4-6F175D3DCCD1}">
-            <a14:hiddenFill xmlns="" xmlns:a14="http://schemas.microsoft.com/office/drawing/2010/main">
+            <a14:hiddenFill xmlns:a14="http://schemas.microsoft.com/office/drawing/2010/main" xmlns="">
               <a:solidFill>
                 <a:schemeClr val="accent1"/>
               </a:solidFill>
             </a14:hiddenFill>
           </a:ext>
           <a:ext uri="{91240B29-F687-4f45-9708-019B960494DF}">
-            <a14:hiddenLine xmlns="" xmlns:a14="http://schemas.microsoft.com/office/drawing/2010/main" w="9525" cap="flat" cmpd="sng" algn="ctr">
+            <a14:hiddenLine xmlns:a14="http://schemas.microsoft.com/office/drawing/2010/main" xmlns="" w="9525" cap="flat" cmpd="sng" algn="ctr">
               <a:solidFill>
                 <a:schemeClr val="tx1"/>
               </a:solidFill>
@@ -12768,7 +12800,7 @@
             </a14:hiddenLine>
           </a:ext>
           <a:ext uri="{AF507438-7753-43e0-B8FC-AC1667EBCBE1}">
-            <a14:hiddenEffects xmlns="" xmlns:a14="http://schemas.microsoft.com/office/drawing/2010/main">
+            <a14:hiddenEffects xmlns:a14="http://schemas.microsoft.com/office/drawing/2010/main" xmlns="">
               <a:effectLst>
                 <a:outerShdw blurRad="63500" dist="38099" dir="2700000" algn="ctr" rotWithShape="0">
                   <a:srgbClr val="000000">

</xml_diff>